<commit_message>
Dateien hochladen nach „Vortrag“
rm zwei folien
</commit_message>
<xml_diff>
--- a/Vortrag/LU-Zerlegung 2.0.pptx
+++ b/Vortrag/LU-Zerlegung 2.0.pptx
@@ -10,10 +10,10 @@
     <p:sldMasterId id="2147483697" r:id="rId6"/>
   </p:sldMasterIdLst>
   <p:notesMasterIdLst>
-    <p:notesMasterId r:id="rId26"/>
+    <p:notesMasterId r:id="rId24"/>
   </p:notesMasterIdLst>
   <p:handoutMasterIdLst>
-    <p:handoutMasterId r:id="rId27"/>
+    <p:handoutMasterId r:id="rId25"/>
   </p:handoutMasterIdLst>
   <p:sldIdLst>
     <p:sldId id="355" r:id="rId7"/>
@@ -23,21 +23,19 @@
     <p:sldId id="390" r:id="rId11"/>
     <p:sldId id="396" r:id="rId12"/>
     <p:sldId id="377" r:id="rId13"/>
-    <p:sldId id="394" r:id="rId14"/>
-    <p:sldId id="398" r:id="rId15"/>
-    <p:sldId id="399" r:id="rId16"/>
-    <p:sldId id="400" r:id="rId17"/>
-    <p:sldId id="401" r:id="rId18"/>
-    <p:sldId id="403" r:id="rId19"/>
-    <p:sldId id="402" r:id="rId20"/>
-    <p:sldId id="408" r:id="rId21"/>
-    <p:sldId id="404" r:id="rId22"/>
-    <p:sldId id="412" r:id="rId23"/>
-    <p:sldId id="411" r:id="rId24"/>
-    <p:sldId id="410" r:id="rId25"/>
+    <p:sldId id="398" r:id="rId14"/>
+    <p:sldId id="399" r:id="rId15"/>
+    <p:sldId id="401" r:id="rId16"/>
+    <p:sldId id="403" r:id="rId17"/>
+    <p:sldId id="402" r:id="rId18"/>
+    <p:sldId id="408" r:id="rId19"/>
+    <p:sldId id="404" r:id="rId20"/>
+    <p:sldId id="412" r:id="rId21"/>
+    <p:sldId id="411" r:id="rId22"/>
+    <p:sldId id="410" r:id="rId23"/>
   </p:sldIdLst>
   <p:sldSz cx="9144000" cy="5143500" type="screen16x9"/>
-  <p:notesSz cx="9925050" cy="6665913"/>
+  <p:notesSz cx="10234613" cy="7104063"/>
   <p:defaultTextStyle>
     <a:defPPr>
       <a:defRPr lang="de-DE"/>
@@ -185,12 +183,12 @@
     </p:ext>
     <p:ext uri="{2D200454-40CA-4A62-9FC3-DE9A4176ACB9}">
       <p15:notesGuideLst xmlns:p15="http://schemas.microsoft.com/office/powerpoint/2012/main">
-        <p15:guide id="1" orient="horz" pos="2100">
+        <p15:guide id="1" orient="horz" pos="2238" userDrawn="1">
           <p15:clr>
             <a:srgbClr val="A4A3A4"/>
           </p15:clr>
         </p15:guide>
-        <p15:guide id="2" pos="3126">
+        <p15:guide id="2" pos="3224" userDrawn="1">
           <p15:clr>
             <a:srgbClr val="A4A3A4"/>
           </p15:clr>
@@ -235,15 +233,15 @@
         </p:nvSpPr>
         <p:spPr>
           <a:xfrm>
-            <a:off x="2" y="0"/>
-            <a:ext cx="4300855" cy="333296"/>
+            <a:off x="3" y="0"/>
+            <a:ext cx="4434999" cy="355204"/>
           </a:xfrm>
           <a:prstGeom prst="rect">
             <a:avLst/>
           </a:prstGeom>
         </p:spPr>
         <p:txBody>
-          <a:bodyPr vert="horz" lIns="90708" tIns="45354" rIns="90708" bIns="45354" rtlCol="0"/>
+          <a:bodyPr vert="horz" lIns="94790" tIns="47395" rIns="94790" bIns="47395" rtlCol="0"/>
           <a:lstStyle>
             <a:lvl1pPr algn="l" fontAlgn="auto">
               <a:spcBef>
@@ -252,7 +250,7 @@
               <a:spcAft>
                 <a:spcPts val="0"/>
               </a:spcAft>
-              <a:defRPr sz="1200">
+              <a:defRPr sz="1300">
                 <a:latin typeface="Arial" pitchFamily="34" charset="0"/>
                 <a:cs typeface="Arial" pitchFamily="34" charset="0"/>
               </a:defRPr>
@@ -278,15 +276,15 @@
         </p:nvSpPr>
         <p:spPr>
           <a:xfrm>
-            <a:off x="5621901" y="0"/>
-            <a:ext cx="4300855" cy="333296"/>
+            <a:off x="5797249" y="0"/>
+            <a:ext cx="4434999" cy="355204"/>
           </a:xfrm>
           <a:prstGeom prst="rect">
             <a:avLst/>
           </a:prstGeom>
         </p:spPr>
         <p:txBody>
-          <a:bodyPr vert="horz" lIns="90708" tIns="45354" rIns="90708" bIns="45354" rtlCol="0"/>
+          <a:bodyPr vert="horz" lIns="94790" tIns="47395" rIns="94790" bIns="47395" rtlCol="0"/>
           <a:lstStyle>
             <a:lvl1pPr algn="r" fontAlgn="auto">
               <a:spcBef>
@@ -295,7 +293,7 @@
               <a:spcAft>
                 <a:spcPts val="0"/>
               </a:spcAft>
-              <a:defRPr sz="1200">
+              <a:defRPr sz="1300">
                 <a:latin typeface="Arial" pitchFamily="34" charset="0"/>
                 <a:cs typeface="Arial" pitchFamily="34" charset="0"/>
               </a:defRPr>
@@ -310,7 +308,7 @@
               <a:pPr>
                 <a:defRPr/>
               </a:pPr>
-              <a:t>15/07/2021</a:t>
+              <a:t>16/07/2021</a:t>
             </a:fld>
             <a:endParaRPr lang="en-GB" dirty="0"/>
           </a:p>
@@ -328,15 +326,15 @@
         </p:nvSpPr>
         <p:spPr>
           <a:xfrm>
-            <a:off x="2" y="6331460"/>
-            <a:ext cx="4300855" cy="333296"/>
+            <a:off x="3" y="6747626"/>
+            <a:ext cx="4434999" cy="355204"/>
           </a:xfrm>
           <a:prstGeom prst="rect">
             <a:avLst/>
           </a:prstGeom>
         </p:spPr>
         <p:txBody>
-          <a:bodyPr vert="horz" lIns="90708" tIns="45354" rIns="90708" bIns="45354" rtlCol="0" anchor="b"/>
+          <a:bodyPr vert="horz" lIns="94790" tIns="47395" rIns="94790" bIns="47395" rtlCol="0" anchor="b"/>
           <a:lstStyle>
             <a:lvl1pPr algn="l" fontAlgn="auto">
               <a:spcBef>
@@ -345,7 +343,7 @@
               <a:spcAft>
                 <a:spcPts val="0"/>
               </a:spcAft>
-              <a:defRPr sz="1200">
+              <a:defRPr sz="1300">
                 <a:latin typeface="Arial" pitchFamily="34" charset="0"/>
                 <a:cs typeface="Arial" pitchFamily="34" charset="0"/>
               </a:defRPr>
@@ -371,15 +369,15 @@
         </p:nvSpPr>
         <p:spPr>
           <a:xfrm>
-            <a:off x="5621901" y="6331460"/>
-            <a:ext cx="4300855" cy="333296"/>
+            <a:off x="5797249" y="6747626"/>
+            <a:ext cx="4434999" cy="355204"/>
           </a:xfrm>
           <a:prstGeom prst="rect">
             <a:avLst/>
           </a:prstGeom>
         </p:spPr>
         <p:txBody>
-          <a:bodyPr vert="horz" lIns="90708" tIns="45354" rIns="90708" bIns="45354" rtlCol="0" anchor="b"/>
+          <a:bodyPr vert="horz" lIns="94790" tIns="47395" rIns="94790" bIns="47395" rtlCol="0" anchor="b"/>
           <a:lstStyle>
             <a:lvl1pPr algn="r" fontAlgn="auto">
               <a:spcBef>
@@ -388,7 +386,7 @@
               <a:spcAft>
                 <a:spcPts val="0"/>
               </a:spcAft>
-              <a:defRPr sz="1200">
+              <a:defRPr sz="1300">
                 <a:latin typeface="Arial" pitchFamily="34" charset="0"/>
                 <a:cs typeface="Arial" pitchFamily="34" charset="0"/>
               </a:defRPr>
@@ -403,7 +401,7 @@
               <a:pPr>
                 <a:defRPr/>
               </a:pPr>
-              <a:t>‹#›</a:t>
+              <a:t>‹Nr.›</a:t>
             </a:fld>
             <a:endParaRPr lang="en-GB"/>
           </a:p>
@@ -454,15 +452,15 @@
         </p:nvSpPr>
         <p:spPr>
           <a:xfrm>
-            <a:off x="2" y="0"/>
-            <a:ext cx="4300855" cy="333296"/>
+            <a:off x="3" y="0"/>
+            <a:ext cx="4434999" cy="355204"/>
           </a:xfrm>
           <a:prstGeom prst="rect">
             <a:avLst/>
           </a:prstGeom>
         </p:spPr>
         <p:txBody>
-          <a:bodyPr vert="horz" lIns="90708" tIns="45354" rIns="90708" bIns="45354" rtlCol="0"/>
+          <a:bodyPr vert="horz" lIns="94790" tIns="47395" rIns="94790" bIns="47395" rtlCol="0"/>
           <a:lstStyle>
             <a:lvl1pPr algn="l" fontAlgn="auto">
               <a:spcBef>
@@ -471,7 +469,7 @@
               <a:spcAft>
                 <a:spcPts val="0"/>
               </a:spcAft>
-              <a:defRPr sz="1200">
+              <a:defRPr sz="1300">
                 <a:latin typeface="Arial" pitchFamily="34" charset="0"/>
                 <a:cs typeface="Arial" pitchFamily="34" charset="0"/>
               </a:defRPr>
@@ -497,15 +495,15 @@
         </p:nvSpPr>
         <p:spPr>
           <a:xfrm>
-            <a:off x="5621901" y="0"/>
-            <a:ext cx="4300855" cy="333296"/>
+            <a:off x="5797249" y="0"/>
+            <a:ext cx="4434999" cy="355204"/>
           </a:xfrm>
           <a:prstGeom prst="rect">
             <a:avLst/>
           </a:prstGeom>
         </p:spPr>
         <p:txBody>
-          <a:bodyPr vert="horz" lIns="90708" tIns="45354" rIns="90708" bIns="45354" rtlCol="0"/>
+          <a:bodyPr vert="horz" lIns="94790" tIns="47395" rIns="94790" bIns="47395" rtlCol="0"/>
           <a:lstStyle>
             <a:lvl1pPr algn="r" fontAlgn="auto">
               <a:spcBef>
@@ -514,7 +512,7 @@
               <a:spcAft>
                 <a:spcPts val="0"/>
               </a:spcAft>
-              <a:defRPr sz="1200">
+              <a:defRPr sz="1300">
                 <a:latin typeface="+mn-lt"/>
                 <a:cs typeface="+mn-cs"/>
               </a:defRPr>
@@ -529,7 +527,7 @@
               <a:pPr>
                 <a:defRPr/>
               </a:pPr>
-              <a:t>15/07/2021</a:t>
+              <a:t>16/07/2021</a:t>
             </a:fld>
             <a:endParaRPr lang="en-GB"/>
           </a:p>
@@ -547,8 +545,8 @@
         </p:nvSpPr>
         <p:spPr>
           <a:xfrm>
-            <a:off x="2740025" y="500063"/>
-            <a:ext cx="4445000" cy="2500312"/>
+            <a:off x="2749550" y="533400"/>
+            <a:ext cx="4735513" cy="2663825"/>
           </a:xfrm>
           <a:prstGeom prst="rect">
             <a:avLst/>
@@ -561,7 +559,7 @@
           </a:ln>
         </p:spPr>
         <p:txBody>
-          <a:bodyPr vert="horz" lIns="90708" tIns="45354" rIns="90708" bIns="45354" rtlCol="0" anchor="ctr"/>
+          <a:bodyPr vert="horz" lIns="94790" tIns="47395" rIns="94790" bIns="47395" rtlCol="0" anchor="ctr"/>
           <a:lstStyle/>
           <a:p>
             <a:pPr lvl="0"/>
@@ -581,15 +579,15 @@
         </p:nvSpPr>
         <p:spPr>
           <a:xfrm>
-            <a:off x="992506" y="3166309"/>
-            <a:ext cx="7940040" cy="2999661"/>
+            <a:off x="1023463" y="3374431"/>
+            <a:ext cx="8187690" cy="3196829"/>
           </a:xfrm>
           <a:prstGeom prst="rect">
             <a:avLst/>
           </a:prstGeom>
         </p:spPr>
         <p:txBody>
-          <a:bodyPr vert="horz" wrap="square" lIns="90708" tIns="45354" rIns="90708" bIns="45354" numCol="1" anchor="t" anchorCtr="0" compatLnSpc="1">
+          <a:bodyPr vert="horz" wrap="square" lIns="94790" tIns="47395" rIns="94790" bIns="47395" numCol="1" anchor="t" anchorCtr="0" compatLnSpc="1">
             <a:prstTxWarp prst="textNoShape">
               <a:avLst/>
             </a:prstTxWarp>
@@ -646,15 +644,15 @@
         </p:nvSpPr>
         <p:spPr>
           <a:xfrm>
-            <a:off x="2" y="6331460"/>
-            <a:ext cx="4300855" cy="333296"/>
+            <a:off x="3" y="6747626"/>
+            <a:ext cx="4434999" cy="355204"/>
           </a:xfrm>
           <a:prstGeom prst="rect">
             <a:avLst/>
           </a:prstGeom>
         </p:spPr>
         <p:txBody>
-          <a:bodyPr vert="horz" lIns="90708" tIns="45354" rIns="90708" bIns="45354" rtlCol="0" anchor="b"/>
+          <a:bodyPr vert="horz" lIns="94790" tIns="47395" rIns="94790" bIns="47395" rtlCol="0" anchor="b"/>
           <a:lstStyle>
             <a:lvl1pPr algn="l" fontAlgn="auto">
               <a:spcBef>
@@ -663,7 +661,7 @@
               <a:spcAft>
                 <a:spcPts val="0"/>
               </a:spcAft>
-              <a:defRPr sz="1200">
+              <a:defRPr sz="1300">
                 <a:latin typeface="Arial" pitchFamily="34" charset="0"/>
                 <a:cs typeface="Arial" pitchFamily="34" charset="0"/>
               </a:defRPr>
@@ -689,15 +687,15 @@
         </p:nvSpPr>
         <p:spPr>
           <a:xfrm>
-            <a:off x="5621901" y="6331460"/>
-            <a:ext cx="4300855" cy="333296"/>
+            <a:off x="5797249" y="6747626"/>
+            <a:ext cx="4434999" cy="355204"/>
           </a:xfrm>
           <a:prstGeom prst="rect">
             <a:avLst/>
           </a:prstGeom>
         </p:spPr>
         <p:txBody>
-          <a:bodyPr vert="horz" lIns="90708" tIns="45354" rIns="90708" bIns="45354" rtlCol="0" anchor="b"/>
+          <a:bodyPr vert="horz" lIns="94790" tIns="47395" rIns="94790" bIns="47395" rtlCol="0" anchor="b"/>
           <a:lstStyle>
             <a:lvl1pPr algn="r" fontAlgn="auto">
               <a:spcBef>
@@ -706,7 +704,7 @@
               <a:spcAft>
                 <a:spcPts val="0"/>
               </a:spcAft>
-              <a:defRPr sz="1200">
+              <a:defRPr sz="1300">
                 <a:latin typeface="+mn-lt"/>
                 <a:cs typeface="+mn-cs"/>
               </a:defRPr>
@@ -721,7 +719,7 @@
               <a:pPr>
                 <a:defRPr/>
               </a:pPr>
-              <a:t>‹#›</a:t>
+              <a:t>‹Nr.›</a:t>
             </a:fld>
             <a:endParaRPr lang="en-GB"/>
           </a:p>
@@ -897,8 +895,8 @@
         </p:nvSpPr>
         <p:spPr>
           <a:xfrm>
-            <a:off x="2740025" y="500063"/>
-            <a:ext cx="4445000" cy="2500312"/>
+            <a:off x="2749550" y="533400"/>
+            <a:ext cx="4735513" cy="2663825"/>
           </a:xfrm>
         </p:spPr>
       </p:sp>
@@ -947,93 +945,6 @@
                 <a:defRPr/>
               </a:pPr>
               <a:t>1</a:t>
-            </a:fld>
-            <a:endParaRPr lang="en-GB"/>
-          </a:p>
-        </p:txBody>
-      </p:sp>
-    </p:spTree>
-  </p:cSld>
-  <p:clrMapOvr>
-    <a:masterClrMapping/>
-  </p:clrMapOvr>
-</p:notes>
-</file>
-
-<file path=ppt/notesSlides/notesSlide2.xml><?xml version="1.0" encoding="utf-8"?>
-<p:notes xmlns:a="http://schemas.openxmlformats.org/drawingml/2006/main" xmlns:r="http://schemas.openxmlformats.org/officeDocument/2006/relationships" xmlns:p="http://schemas.openxmlformats.org/presentationml/2006/main">
-  <p:cSld>
-    <p:spTree>
-      <p:nvGrpSpPr>
-        <p:cNvPr id="1" name=""/>
-        <p:cNvGrpSpPr/>
-        <p:nvPr/>
-      </p:nvGrpSpPr>
-      <p:grpSpPr>
-        <a:xfrm>
-          <a:off x="0" y="0"/>
-          <a:ext cx="0" cy="0"/>
-          <a:chOff x="0" y="0"/>
-          <a:chExt cx="0" cy="0"/>
-        </a:xfrm>
-      </p:grpSpPr>
-      <p:sp>
-        <p:nvSpPr>
-          <p:cNvPr id="2" name="Folienbildplatzhalter 1"/>
-          <p:cNvSpPr>
-            <a:spLocks noGrp="1" noRot="1" noChangeAspect="1"/>
-          </p:cNvSpPr>
-          <p:nvPr>
-            <p:ph type="sldImg"/>
-          </p:nvPr>
-        </p:nvSpPr>
-        <p:spPr/>
-      </p:sp>
-      <p:sp>
-        <p:nvSpPr>
-          <p:cNvPr id="3" name="Notizenplatzhalter 2"/>
-          <p:cNvSpPr>
-            <a:spLocks noGrp="1"/>
-          </p:cNvSpPr>
-          <p:nvPr>
-            <p:ph type="body" idx="1"/>
-          </p:nvPr>
-        </p:nvSpPr>
-        <p:spPr/>
-        <p:txBody>
-          <a:bodyPr>
-            <a:normAutofit/>
-          </a:bodyPr>
-          <a:lstStyle/>
-          <a:p>
-            <a:endParaRPr lang="de-DE" dirty="0"/>
-          </a:p>
-        </p:txBody>
-      </p:sp>
-      <p:sp>
-        <p:nvSpPr>
-          <p:cNvPr id="4" name="Foliennummernplatzhalter 3"/>
-          <p:cNvSpPr>
-            <a:spLocks noGrp="1"/>
-          </p:cNvSpPr>
-          <p:nvPr>
-            <p:ph type="sldNum" sz="quarter" idx="10"/>
-          </p:nvPr>
-        </p:nvSpPr>
-        <p:spPr/>
-        <p:txBody>
-          <a:bodyPr/>
-          <a:lstStyle/>
-          <a:p>
-            <a:pPr>
-              <a:defRPr/>
-            </a:pPr>
-            <a:fld id="{00AFC6D0-44D5-4EB7-828F-6F464F83D79A}" type="slidenum">
-              <a:rPr lang="en-GB" smtClean="0"/>
-              <a:pPr>
-                <a:defRPr/>
-              </a:pPr>
-              <a:t>8</a:t>
             </a:fld>
             <a:endParaRPr lang="en-GB"/>
           </a:p>
@@ -1253,7 +1164,7 @@
             <a:fld id="{CE58CB1E-F828-4F11-99E0-327109AF9DA4}" type="slidenum">
               <a:rPr lang="de-DE" smtClean="0"/>
               <a:pPr/>
-              <a:t>‹#›</a:t>
+              <a:t>‹Nr.›</a:t>
             </a:fld>
             <a:endParaRPr lang="de-DE" dirty="0"/>
           </a:p>
@@ -1380,7 +1291,7 @@
             <a:fld id="{CE58CB1E-F828-4F11-99E0-327109AF9DA4}" type="slidenum">
               <a:rPr lang="de-DE" smtClean="0"/>
               <a:pPr/>
-              <a:t>‹#›</a:t>
+              <a:t>‹Nr.›</a:t>
             </a:fld>
             <a:endParaRPr lang="de-DE" dirty="0"/>
           </a:p>
@@ -1620,7 +1531,7 @@
             <a:fld id="{CE58CB1E-F828-4F11-99E0-327109AF9DA4}" type="slidenum">
               <a:rPr lang="de-DE" smtClean="0"/>
               <a:pPr/>
-              <a:t>‹#›</a:t>
+              <a:t>‹Nr.›</a:t>
             </a:fld>
             <a:endParaRPr lang="de-DE" dirty="0"/>
           </a:p>
@@ -1769,7 +1680,7 @@
             <a:fld id="{CE58CB1E-F828-4F11-99E0-327109AF9DA4}" type="slidenum">
               <a:rPr lang="de-DE" smtClean="0"/>
               <a:pPr/>
-              <a:t>‹#›</a:t>
+              <a:t>‹Nr.›</a:t>
             </a:fld>
             <a:endParaRPr lang="de-DE" dirty="0"/>
           </a:p>
@@ -1926,7 +1837,7 @@
             <a:fld id="{CE58CB1E-F828-4F11-99E0-327109AF9DA4}" type="slidenum">
               <a:rPr lang="de-DE" smtClean="0"/>
               <a:pPr/>
-              <a:t>‹#›</a:t>
+              <a:t>‹Nr.›</a:t>
             </a:fld>
             <a:endParaRPr lang="de-DE" dirty="0"/>
           </a:p>
@@ -2135,7 +2046,7 @@
             <a:fld id="{CE58CB1E-F828-4F11-99E0-327109AF9DA4}" type="slidenum">
               <a:rPr lang="de-DE" smtClean="0"/>
               <a:pPr/>
-              <a:t>‹#›</a:t>
+              <a:t>‹Nr.›</a:t>
             </a:fld>
             <a:endParaRPr lang="de-DE" dirty="0"/>
           </a:p>
@@ -2399,7 +2310,7 @@
             <a:fld id="{CE58CB1E-F828-4F11-99E0-327109AF9DA4}" type="slidenum">
               <a:rPr lang="de-DE" smtClean="0"/>
               <a:pPr/>
-              <a:t>‹#›</a:t>
+              <a:t>‹Nr.›</a:t>
             </a:fld>
             <a:endParaRPr lang="de-DE" dirty="0"/>
           </a:p>
@@ -2648,7 +2559,7 @@
             <a:fld id="{CE58CB1E-F828-4F11-99E0-327109AF9DA4}" type="slidenum">
               <a:rPr lang="de-DE" smtClean="0"/>
               <a:pPr/>
-              <a:t>‹#›</a:t>
+              <a:t>‹Nr.›</a:t>
             </a:fld>
             <a:endParaRPr lang="de-DE" dirty="0"/>
           </a:p>
@@ -2847,7 +2758,7 @@
             <a:fld id="{CE58CB1E-F828-4F11-99E0-327109AF9DA4}" type="slidenum">
               <a:rPr lang="de-DE" smtClean="0"/>
               <a:pPr/>
-              <a:t>‹#›</a:t>
+              <a:t>‹Nr.›</a:t>
             </a:fld>
             <a:endParaRPr lang="de-DE" dirty="0"/>
           </a:p>
@@ -3044,7 +2955,7 @@
             <a:fld id="{CE58CB1E-F828-4F11-99E0-327109AF9DA4}" type="slidenum">
               <a:rPr lang="de-DE" smtClean="0"/>
               <a:pPr/>
-              <a:t>‹#›</a:t>
+              <a:t>‹Nr.›</a:t>
             </a:fld>
             <a:endParaRPr lang="de-DE" dirty="0"/>
           </a:p>
@@ -3363,7 +3274,7 @@
             <a:fld id="{CE58CB1E-F828-4F11-99E0-327109AF9DA4}" type="slidenum">
               <a:rPr lang="de-DE" smtClean="0"/>
               <a:pPr/>
-              <a:t>‹#›</a:t>
+              <a:t>‹Nr.›</a:t>
             </a:fld>
             <a:endParaRPr lang="de-DE" dirty="0"/>
           </a:p>
@@ -3539,7 +3450,7 @@
             <a:fld id="{CE58CB1E-F828-4F11-99E0-327109AF9DA4}" type="slidenum">
               <a:rPr lang="de-DE" smtClean="0"/>
               <a:pPr/>
-              <a:t>‹#›</a:t>
+              <a:t>‹Nr.›</a:t>
             </a:fld>
             <a:endParaRPr lang="de-DE" dirty="0"/>
           </a:p>
@@ -3804,7 +3715,7 @@
             <a:fld id="{CE58CB1E-F828-4F11-99E0-327109AF9DA4}" type="slidenum">
               <a:rPr lang="de-DE" smtClean="0"/>
               <a:pPr/>
-              <a:t>‹#›</a:t>
+              <a:t>‹Nr.›</a:t>
             </a:fld>
             <a:endParaRPr lang="de-DE" dirty="0"/>
           </a:p>
@@ -4085,7 +3996,7 @@
             <a:fld id="{CE58CB1E-F828-4F11-99E0-327109AF9DA4}" type="slidenum">
               <a:rPr lang="de-DE" smtClean="0"/>
               <a:pPr/>
-              <a:t>‹#›</a:t>
+              <a:t>‹Nr.›</a:t>
             </a:fld>
             <a:endParaRPr lang="de-DE" dirty="0"/>
           </a:p>
@@ -4586,7 +4497,7 @@
                   <a:spcPct val="114000"/>
                 </a:lnSpc>
               </a:pPr>
-              <a:t>‹#›</a:t>
+              <a:t>‹Nr.›</a:t>
             </a:fld>
             <a:endParaRPr lang="de-DE" sz="1200" dirty="0">
               <a:latin typeface="+mn-lt"/>
@@ -4678,7 +4589,7 @@
             <a:fld id="{CE58CB1E-F828-4F11-99E0-327109AF9DA4}" type="slidenum">
               <a:rPr lang="de-DE" smtClean="0"/>
               <a:pPr/>
-              <a:t>‹#›</a:t>
+              <a:t>‹Nr.›</a:t>
             </a:fld>
             <a:endParaRPr lang="de-DE"/>
           </a:p>
@@ -5192,7 +5103,7 @@
             <a:fld id="{CE58CB1E-F828-4F11-99E0-327109AF9DA4}" type="slidenum">
               <a:rPr lang="de-DE" smtClean="0"/>
               <a:pPr/>
-              <a:t>‹#›</a:t>
+              <a:t>‹Nr.›</a:t>
             </a:fld>
             <a:endParaRPr lang="de-DE" dirty="0"/>
           </a:p>
@@ -5840,7 +5751,7 @@
             <a:fld id="{CE58CB1E-F828-4F11-99E0-327109AF9DA4}" type="slidenum">
               <a:rPr lang="de-DE" smtClean="0"/>
               <a:pPr/>
-              <a:t>‹#›</a:t>
+              <a:t>‹Nr.›</a:t>
             </a:fld>
             <a:endParaRPr lang="de-DE" dirty="0"/>
           </a:p>
@@ -6437,7 +6348,7 @@
             <a:fld id="{CE58CB1E-F828-4F11-99E0-327109AF9DA4}" type="slidenum">
               <a:rPr lang="de-DE" smtClean="0"/>
               <a:pPr/>
-              <a:t>‹#›</a:t>
+              <a:t>‹Nr.›</a:t>
             </a:fld>
             <a:endParaRPr lang="de-DE" dirty="0"/>
           </a:p>
@@ -7034,7 +6945,7 @@
             <a:fld id="{CE58CB1E-F828-4F11-99E0-327109AF9DA4}" type="slidenum">
               <a:rPr lang="de-DE" smtClean="0"/>
               <a:pPr/>
-              <a:t>‹#›</a:t>
+              <a:t>‹Nr.›</a:t>
             </a:fld>
             <a:endParaRPr lang="de-DE" dirty="0"/>
           </a:p>
@@ -7543,13 +7454,22 @@
             <p:ph type="title"/>
           </p:nvPr>
         </p:nvSpPr>
-        <p:spPr/>
+        <p:spPr>
+          <a:xfrm>
+            <a:off x="319088" y="759499"/>
+            <a:ext cx="8508999" cy="383381"/>
+          </a:xfrm>
+        </p:spPr>
         <p:txBody>
           <a:bodyPr/>
           <a:lstStyle/>
           <a:p>
             <a:r>
-              <a:rPr lang="de-DE" dirty="0"/>
+              <a:rPr lang="de-DE" b="1" dirty="0">
+                <a:solidFill>
+                  <a:schemeClr val="tx2"/>
+                </a:solidFill>
+              </a:rPr>
               <a:t>Die LU-Zerlegung</a:t>
             </a:r>
           </a:p>
@@ -7644,8 +7564,8 @@
         </p:nvSpPr>
         <p:spPr>
           <a:xfrm>
-            <a:off x="490540" y="1615194"/>
-            <a:ext cx="2295522" cy="273845"/>
+            <a:off x="519113" y="1544021"/>
+            <a:ext cx="1566861" cy="273845"/>
           </a:xfrm>
         </p:spPr>
         <p:txBody>
@@ -7654,7 +7574,7 @@
           <a:p>
             <a:r>
               <a:rPr lang="de-DE" dirty="0"/>
-              <a:t>Lineares Gleichungssystem:</a:t>
+              <a:t>Relativer Fehler:</a:t>
             </a:r>
           </a:p>
         </p:txBody>
@@ -7681,7 +7601,7 @@
           <a:p>
             <a:r>
               <a:rPr lang="de-DE" dirty="0"/>
-              <a:t>Kondition Beispiel</a:t>
+              <a:t>Relativer Fehler</a:t>
             </a:r>
           </a:p>
         </p:txBody>
@@ -7705,1402 +7625,6 @@
               <a:rPr lang="de-DE" smtClean="0"/>
               <a:pPr/>
               <a:t>10</a:t>
-            </a:fld>
-            <a:endParaRPr lang="de-DE" dirty="0"/>
-          </a:p>
-        </p:txBody>
-      </p:sp>
-      <p:sp>
-        <p:nvSpPr>
-          <p:cNvPr id="7" name="Fußzeilenplatzhalter 4"/>
-          <p:cNvSpPr>
-            <a:spLocks noGrp="1"/>
-          </p:cNvSpPr>
-          <p:nvPr>
-            <p:ph type="ftr" sz="quarter" idx="12"/>
-          </p:nvPr>
-        </p:nvSpPr>
-        <p:spPr/>
-        <p:txBody>
-          <a:bodyPr/>
-          <a:lstStyle/>
-          <a:p>
-            <a:r>
-              <a:rPr lang="de-DE" sz="1000" dirty="0"/>
-              <a:t>Von </a:t>
-            </a:r>
-            <a:r>
-              <a:rPr lang="de-DE" sz="1000" dirty="0" err="1"/>
-              <a:t>Aleksandre</a:t>
-            </a:r>
-            <a:r>
-              <a:rPr lang="de-DE" sz="1000" dirty="0"/>
-              <a:t> </a:t>
-            </a:r>
-            <a:r>
-              <a:rPr lang="de-DE" sz="1000" dirty="0" err="1"/>
-              <a:t>Kandelaki</a:t>
-            </a:r>
-            <a:r>
-              <a:rPr lang="de-DE" sz="1000" dirty="0"/>
-              <a:t>, Matthias Staritz und Benjamin Liertz</a:t>
-            </a:r>
-          </a:p>
-        </p:txBody>
-      </p:sp>
-      <p:sp>
-        <p:nvSpPr>
-          <p:cNvPr id="11" name="Inhaltsplatzhalter 1">
-            <a:extLst>
-              <a:ext uri="{FF2B5EF4-FFF2-40B4-BE49-F238E27FC236}">
-                <a16:creationId xmlns:a16="http://schemas.microsoft.com/office/drawing/2014/main" id="{50248EC9-836D-4B59-A3DC-0C01D29E621F}"/>
-              </a:ext>
-            </a:extLst>
-          </p:cNvPr>
-          <p:cNvSpPr txBox="1">
-            <a:spLocks/>
-          </p:cNvSpPr>
-          <p:nvPr/>
-        </p:nvSpPr>
-        <p:spPr>
-          <a:xfrm>
-            <a:off x="490540" y="3284101"/>
-            <a:ext cx="3164680" cy="273844"/>
-          </a:xfrm>
-          <a:prstGeom prst="rect">
-            <a:avLst/>
-          </a:prstGeom>
-          <a:noFill/>
-          <a:ln w="9525">
-            <a:noFill/>
-            <a:miter lim="800000"/>
-            <a:headEnd/>
-            <a:tailEnd/>
-          </a:ln>
-        </p:spPr>
-        <p:txBody>
-          <a:bodyPr vert="horz" wrap="square" lIns="0" tIns="0" rIns="0" bIns="0" numCol="1" anchor="t" anchorCtr="0" compatLnSpc="1">
-            <a:prstTxWarp prst="textNoShape">
-              <a:avLst/>
-            </a:prstTxWarp>
-          </a:bodyPr>
-          <a:lstStyle>
-            <a:lvl1pPr algn="l" rtl="0" eaLnBrk="0" fontAlgn="base" hangingPunct="0">
-              <a:lnSpc>
-                <a:spcPct val="114000"/>
-              </a:lnSpc>
-              <a:spcBef>
-                <a:spcPct val="0"/>
-              </a:spcBef>
-              <a:spcAft>
-                <a:spcPct val="0"/>
-              </a:spcAft>
-              <a:defRPr lang="de-DE" sz="1400" kern="1200" noProof="0" dirty="0" smtClean="0">
-                <a:solidFill>
-                  <a:schemeClr val="tx1"/>
-                </a:solidFill>
-                <a:latin typeface="+mn-lt"/>
-                <a:ea typeface="+mn-ea"/>
-                <a:cs typeface="+mn-cs"/>
-              </a:defRPr>
-            </a:lvl1pPr>
-            <a:lvl2pPr marL="176213" indent="-176213" algn="l" rtl="0" eaLnBrk="0" fontAlgn="base" hangingPunct="0">
-              <a:lnSpc>
-                <a:spcPct val="114000"/>
-              </a:lnSpc>
-              <a:spcBef>
-                <a:spcPct val="0"/>
-              </a:spcBef>
-              <a:spcAft>
-                <a:spcPct val="0"/>
-              </a:spcAft>
-              <a:buFont typeface="Arial" charset="0"/>
-              <a:buChar char="•"/>
-              <a:defRPr lang="de-DE" sz="1400" kern="1200" noProof="0" dirty="0" smtClean="0">
-                <a:solidFill>
-                  <a:schemeClr val="tx1"/>
-                </a:solidFill>
-                <a:latin typeface="+mn-lt"/>
-                <a:ea typeface="+mn-ea"/>
-                <a:cs typeface="+mn-cs"/>
-              </a:defRPr>
-            </a:lvl2pPr>
-            <a:lvl3pPr marL="360363" indent="-184150" algn="l" rtl="0" eaLnBrk="0" fontAlgn="base" hangingPunct="0">
-              <a:lnSpc>
-                <a:spcPct val="125000"/>
-              </a:lnSpc>
-              <a:spcBef>
-                <a:spcPct val="0"/>
-              </a:spcBef>
-              <a:spcAft>
-                <a:spcPct val="0"/>
-              </a:spcAft>
-              <a:buFont typeface="Symbol" pitchFamily="18" charset="2"/>
-              <a:buChar char="-"/>
-              <a:defRPr sz="1400" kern="1200">
-                <a:solidFill>
-                  <a:schemeClr val="tx1"/>
-                </a:solidFill>
-                <a:latin typeface="+mn-lt"/>
-                <a:ea typeface="+mn-ea"/>
-                <a:cs typeface="+mn-cs"/>
-              </a:defRPr>
-            </a:lvl3pPr>
-            <a:lvl4pPr marL="538163" indent="-177800" algn="l" rtl="0" eaLnBrk="0" fontAlgn="base" hangingPunct="0">
-              <a:lnSpc>
-                <a:spcPct val="125000"/>
-              </a:lnSpc>
-              <a:spcBef>
-                <a:spcPct val="0"/>
-              </a:spcBef>
-              <a:spcAft>
-                <a:spcPct val="0"/>
-              </a:spcAft>
-              <a:buFont typeface="Symbol" pitchFamily="18" charset="2"/>
-              <a:buChar char="-"/>
-              <a:defRPr sz="1400" kern="1200">
-                <a:solidFill>
-                  <a:schemeClr val="tx1"/>
-                </a:solidFill>
-                <a:latin typeface="+mn-lt"/>
-                <a:ea typeface="+mn-ea"/>
-                <a:cs typeface="+mn-cs"/>
-              </a:defRPr>
-            </a:lvl4pPr>
-            <a:lvl5pPr marL="714375" indent="-176213" algn="l" rtl="0" eaLnBrk="0" fontAlgn="base" hangingPunct="0">
-              <a:lnSpc>
-                <a:spcPct val="125000"/>
-              </a:lnSpc>
-              <a:spcBef>
-                <a:spcPct val="0"/>
-              </a:spcBef>
-              <a:spcAft>
-                <a:spcPct val="0"/>
-              </a:spcAft>
-              <a:buFont typeface="Symbol" pitchFamily="18" charset="2"/>
-              <a:buChar char="-"/>
-              <a:defRPr sz="1400" kern="1200">
-                <a:solidFill>
-                  <a:schemeClr val="tx1"/>
-                </a:solidFill>
-                <a:latin typeface="+mn-lt"/>
-                <a:ea typeface="+mn-ea"/>
-                <a:cs typeface="+mn-cs"/>
-              </a:defRPr>
-            </a:lvl5pPr>
-            <a:lvl6pPr marL="2514600" indent="-228600" algn="l" defTabSz="914400" rtl="0" eaLnBrk="1" latinLnBrk="0" hangingPunct="1">
-              <a:spcBef>
-                <a:spcPct val="20000"/>
-              </a:spcBef>
-              <a:buFont typeface="Arial" pitchFamily="34" charset="0"/>
-              <a:buChar char="•"/>
-              <a:defRPr sz="2000" kern="1200">
-                <a:solidFill>
-                  <a:schemeClr val="tx1"/>
-                </a:solidFill>
-                <a:latin typeface="+mn-lt"/>
-                <a:ea typeface="+mn-ea"/>
-                <a:cs typeface="+mn-cs"/>
-              </a:defRPr>
-            </a:lvl6pPr>
-            <a:lvl7pPr marL="2971800" indent="-228600" algn="l" defTabSz="914400" rtl="0" eaLnBrk="1" latinLnBrk="0" hangingPunct="1">
-              <a:spcBef>
-                <a:spcPct val="20000"/>
-              </a:spcBef>
-              <a:buFont typeface="Arial" pitchFamily="34" charset="0"/>
-              <a:buChar char="•"/>
-              <a:defRPr sz="2000" kern="1200">
-                <a:solidFill>
-                  <a:schemeClr val="tx1"/>
-                </a:solidFill>
-                <a:latin typeface="+mn-lt"/>
-                <a:ea typeface="+mn-ea"/>
-                <a:cs typeface="+mn-cs"/>
-              </a:defRPr>
-            </a:lvl7pPr>
-            <a:lvl8pPr marL="3429000" indent="-228600" algn="l" defTabSz="914400" rtl="0" eaLnBrk="1" latinLnBrk="0" hangingPunct="1">
-              <a:spcBef>
-                <a:spcPct val="20000"/>
-              </a:spcBef>
-              <a:buFont typeface="Arial" pitchFamily="34" charset="0"/>
-              <a:buChar char="•"/>
-              <a:defRPr sz="2000" kern="1200">
-                <a:solidFill>
-                  <a:schemeClr val="tx1"/>
-                </a:solidFill>
-                <a:latin typeface="+mn-lt"/>
-                <a:ea typeface="+mn-ea"/>
-                <a:cs typeface="+mn-cs"/>
-              </a:defRPr>
-            </a:lvl8pPr>
-            <a:lvl9pPr marL="3886200" indent="-228600" algn="l" defTabSz="914400" rtl="0" eaLnBrk="1" latinLnBrk="0" hangingPunct="1">
-              <a:spcBef>
-                <a:spcPct val="20000"/>
-              </a:spcBef>
-              <a:buFont typeface="Arial" pitchFamily="34" charset="0"/>
-              <a:buChar char="•"/>
-              <a:defRPr sz="2000" kern="1200">
-                <a:solidFill>
-                  <a:schemeClr val="tx1"/>
-                </a:solidFill>
-                <a:latin typeface="+mn-lt"/>
-                <a:ea typeface="+mn-ea"/>
-                <a:cs typeface="+mn-cs"/>
-              </a:defRPr>
-            </a:lvl9pPr>
-          </a:lstStyle>
-          <a:p>
-            <a:r>
-              <a:rPr lang="de-DE" dirty="0"/>
-              <a:t>Störung der rechten Seite mit  0 &lt; ϵ ≪ 1</a:t>
-            </a:r>
-          </a:p>
-        </p:txBody>
-      </p:sp>
-      <p:pic>
-        <p:nvPicPr>
-          <p:cNvPr id="6" name="Grafik 5">
-            <a:extLst>
-              <a:ext uri="{FF2B5EF4-FFF2-40B4-BE49-F238E27FC236}">
-                <a16:creationId xmlns:a16="http://schemas.microsoft.com/office/drawing/2014/main" id="{CDC64237-D7C6-4492-BEA6-46C3D055BBCF}"/>
-              </a:ext>
-            </a:extLst>
-          </p:cNvPr>
-          <p:cNvPicPr>
-            <a:picLocks noChangeAspect="1"/>
-          </p:cNvPicPr>
-          <p:nvPr/>
-        </p:nvPicPr>
-        <p:blipFill rotWithShape="1">
-          <a:blip r:embed="rId2"/>
-          <a:srcRect r="25447"/>
-          <a:stretch/>
-        </p:blipFill>
-        <p:spPr>
-          <a:xfrm>
-            <a:off x="614363" y="2088430"/>
-            <a:ext cx="3087687" cy="637456"/>
-          </a:xfrm>
-          <a:prstGeom prst="rect">
-            <a:avLst/>
-          </a:prstGeom>
-        </p:spPr>
-      </p:pic>
-      <p:pic>
-        <p:nvPicPr>
-          <p:cNvPr id="10" name="Grafik 9">
-            <a:extLst>
-              <a:ext uri="{FF2B5EF4-FFF2-40B4-BE49-F238E27FC236}">
-                <a16:creationId xmlns:a16="http://schemas.microsoft.com/office/drawing/2014/main" id="{7D572F9B-51E6-439D-A258-20926070AB5C}"/>
-              </a:ext>
-            </a:extLst>
-          </p:cNvPr>
-          <p:cNvPicPr>
-            <a:picLocks noChangeAspect="1"/>
-          </p:cNvPicPr>
-          <p:nvPr/>
-        </p:nvPicPr>
-        <p:blipFill rotWithShape="1">
-          <a:blip r:embed="rId3"/>
-          <a:srcRect r="32675"/>
-          <a:stretch/>
-        </p:blipFill>
-        <p:spPr>
-          <a:xfrm>
-            <a:off x="614363" y="3691737"/>
-            <a:ext cx="2947987" cy="652801"/>
-          </a:xfrm>
-          <a:prstGeom prst="rect">
-            <a:avLst/>
-          </a:prstGeom>
-        </p:spPr>
-      </p:pic>
-      <p:sp>
-        <p:nvSpPr>
-          <p:cNvPr id="13" name="Inhaltsplatzhalter 1">
-            <a:extLst>
-              <a:ext uri="{FF2B5EF4-FFF2-40B4-BE49-F238E27FC236}">
-                <a16:creationId xmlns:a16="http://schemas.microsoft.com/office/drawing/2014/main" id="{0D73D764-9903-49C5-9D33-D8B354E1897D}"/>
-              </a:ext>
-            </a:extLst>
-          </p:cNvPr>
-          <p:cNvSpPr txBox="1">
-            <a:spLocks/>
-          </p:cNvSpPr>
-          <p:nvPr/>
-        </p:nvSpPr>
-        <p:spPr>
-          <a:xfrm>
-            <a:off x="4516440" y="2240684"/>
-            <a:ext cx="785810" cy="273845"/>
-          </a:xfrm>
-          <a:prstGeom prst="rect">
-            <a:avLst/>
-          </a:prstGeom>
-          <a:noFill/>
-          <a:ln w="9525">
-            <a:noFill/>
-            <a:miter lim="800000"/>
-            <a:headEnd/>
-            <a:tailEnd/>
-          </a:ln>
-        </p:spPr>
-        <p:txBody>
-          <a:bodyPr vert="horz" wrap="square" lIns="0" tIns="0" rIns="0" bIns="0" numCol="1" anchor="t" anchorCtr="0" compatLnSpc="1">
-            <a:prstTxWarp prst="textNoShape">
-              <a:avLst/>
-            </a:prstTxWarp>
-          </a:bodyPr>
-          <a:lstStyle>
-            <a:lvl1pPr algn="l" rtl="0" eaLnBrk="0" fontAlgn="base" hangingPunct="0">
-              <a:lnSpc>
-                <a:spcPct val="114000"/>
-              </a:lnSpc>
-              <a:spcBef>
-                <a:spcPct val="0"/>
-              </a:spcBef>
-              <a:spcAft>
-                <a:spcPct val="0"/>
-              </a:spcAft>
-              <a:defRPr lang="de-DE" sz="1400" kern="1200" noProof="0" dirty="0" smtClean="0">
-                <a:solidFill>
-                  <a:schemeClr val="tx1"/>
-                </a:solidFill>
-                <a:latin typeface="+mn-lt"/>
-                <a:ea typeface="+mn-ea"/>
-                <a:cs typeface="+mn-cs"/>
-              </a:defRPr>
-            </a:lvl1pPr>
-            <a:lvl2pPr marL="176213" indent="-176213" algn="l" rtl="0" eaLnBrk="0" fontAlgn="base" hangingPunct="0">
-              <a:lnSpc>
-                <a:spcPct val="114000"/>
-              </a:lnSpc>
-              <a:spcBef>
-                <a:spcPct val="0"/>
-              </a:spcBef>
-              <a:spcAft>
-                <a:spcPct val="0"/>
-              </a:spcAft>
-              <a:buFont typeface="Arial" charset="0"/>
-              <a:buChar char="•"/>
-              <a:defRPr lang="de-DE" sz="1400" kern="1200" noProof="0" dirty="0" smtClean="0">
-                <a:solidFill>
-                  <a:schemeClr val="tx1"/>
-                </a:solidFill>
-                <a:latin typeface="+mn-lt"/>
-                <a:ea typeface="+mn-ea"/>
-                <a:cs typeface="+mn-cs"/>
-              </a:defRPr>
-            </a:lvl2pPr>
-            <a:lvl3pPr marL="360363" indent="-184150" algn="l" rtl="0" eaLnBrk="0" fontAlgn="base" hangingPunct="0">
-              <a:lnSpc>
-                <a:spcPct val="125000"/>
-              </a:lnSpc>
-              <a:spcBef>
-                <a:spcPct val="0"/>
-              </a:spcBef>
-              <a:spcAft>
-                <a:spcPct val="0"/>
-              </a:spcAft>
-              <a:buFont typeface="Symbol" pitchFamily="18" charset="2"/>
-              <a:buChar char="-"/>
-              <a:defRPr sz="1400" kern="1200">
-                <a:solidFill>
-                  <a:schemeClr val="tx1"/>
-                </a:solidFill>
-                <a:latin typeface="+mn-lt"/>
-                <a:ea typeface="+mn-ea"/>
-                <a:cs typeface="+mn-cs"/>
-              </a:defRPr>
-            </a:lvl3pPr>
-            <a:lvl4pPr marL="538163" indent="-177800" algn="l" rtl="0" eaLnBrk="0" fontAlgn="base" hangingPunct="0">
-              <a:lnSpc>
-                <a:spcPct val="125000"/>
-              </a:lnSpc>
-              <a:spcBef>
-                <a:spcPct val="0"/>
-              </a:spcBef>
-              <a:spcAft>
-                <a:spcPct val="0"/>
-              </a:spcAft>
-              <a:buFont typeface="Symbol" pitchFamily="18" charset="2"/>
-              <a:buChar char="-"/>
-              <a:defRPr sz="1400" kern="1200">
-                <a:solidFill>
-                  <a:schemeClr val="tx1"/>
-                </a:solidFill>
-                <a:latin typeface="+mn-lt"/>
-                <a:ea typeface="+mn-ea"/>
-                <a:cs typeface="+mn-cs"/>
-              </a:defRPr>
-            </a:lvl4pPr>
-            <a:lvl5pPr marL="714375" indent="-176213" algn="l" rtl="0" eaLnBrk="0" fontAlgn="base" hangingPunct="0">
-              <a:lnSpc>
-                <a:spcPct val="125000"/>
-              </a:lnSpc>
-              <a:spcBef>
-                <a:spcPct val="0"/>
-              </a:spcBef>
-              <a:spcAft>
-                <a:spcPct val="0"/>
-              </a:spcAft>
-              <a:buFont typeface="Symbol" pitchFamily="18" charset="2"/>
-              <a:buChar char="-"/>
-              <a:defRPr sz="1400" kern="1200">
-                <a:solidFill>
-                  <a:schemeClr val="tx1"/>
-                </a:solidFill>
-                <a:latin typeface="+mn-lt"/>
-                <a:ea typeface="+mn-ea"/>
-                <a:cs typeface="+mn-cs"/>
-              </a:defRPr>
-            </a:lvl5pPr>
-            <a:lvl6pPr marL="2514600" indent="-228600" algn="l" defTabSz="914400" rtl="0" eaLnBrk="1" latinLnBrk="0" hangingPunct="1">
-              <a:spcBef>
-                <a:spcPct val="20000"/>
-              </a:spcBef>
-              <a:buFont typeface="Arial" pitchFamily="34" charset="0"/>
-              <a:buChar char="•"/>
-              <a:defRPr sz="2000" kern="1200">
-                <a:solidFill>
-                  <a:schemeClr val="tx1"/>
-                </a:solidFill>
-                <a:latin typeface="+mn-lt"/>
-                <a:ea typeface="+mn-ea"/>
-                <a:cs typeface="+mn-cs"/>
-              </a:defRPr>
-            </a:lvl6pPr>
-            <a:lvl7pPr marL="2971800" indent="-228600" algn="l" defTabSz="914400" rtl="0" eaLnBrk="1" latinLnBrk="0" hangingPunct="1">
-              <a:spcBef>
-                <a:spcPct val="20000"/>
-              </a:spcBef>
-              <a:buFont typeface="Arial" pitchFamily="34" charset="0"/>
-              <a:buChar char="•"/>
-              <a:defRPr sz="2000" kern="1200">
-                <a:solidFill>
-                  <a:schemeClr val="tx1"/>
-                </a:solidFill>
-                <a:latin typeface="+mn-lt"/>
-                <a:ea typeface="+mn-ea"/>
-                <a:cs typeface="+mn-cs"/>
-              </a:defRPr>
-            </a:lvl7pPr>
-            <a:lvl8pPr marL="3429000" indent="-228600" algn="l" defTabSz="914400" rtl="0" eaLnBrk="1" latinLnBrk="0" hangingPunct="1">
-              <a:spcBef>
-                <a:spcPct val="20000"/>
-              </a:spcBef>
-              <a:buFont typeface="Arial" pitchFamily="34" charset="0"/>
-              <a:buChar char="•"/>
-              <a:defRPr sz="2000" kern="1200">
-                <a:solidFill>
-                  <a:schemeClr val="tx1"/>
-                </a:solidFill>
-                <a:latin typeface="+mn-lt"/>
-                <a:ea typeface="+mn-ea"/>
-                <a:cs typeface="+mn-cs"/>
-              </a:defRPr>
-            </a:lvl8pPr>
-            <a:lvl9pPr marL="3886200" indent="-228600" algn="l" defTabSz="914400" rtl="0" eaLnBrk="1" latinLnBrk="0" hangingPunct="1">
-              <a:spcBef>
-                <a:spcPct val="20000"/>
-              </a:spcBef>
-              <a:buFont typeface="Arial" pitchFamily="34" charset="0"/>
-              <a:buChar char="•"/>
-              <a:defRPr sz="2000" kern="1200">
-                <a:solidFill>
-                  <a:schemeClr val="tx1"/>
-                </a:solidFill>
-                <a:latin typeface="+mn-lt"/>
-                <a:ea typeface="+mn-ea"/>
-                <a:cs typeface="+mn-cs"/>
-              </a:defRPr>
-            </a:lvl9pPr>
-          </a:lstStyle>
-          <a:p>
-            <a:r>
-              <a:rPr lang="de-DE" dirty="0"/>
-              <a:t>Lösung:</a:t>
-            </a:r>
-          </a:p>
-        </p:txBody>
-      </p:sp>
-      <p:sp>
-        <p:nvSpPr>
-          <p:cNvPr id="14" name="Inhaltsplatzhalter 1">
-            <a:extLst>
-              <a:ext uri="{FF2B5EF4-FFF2-40B4-BE49-F238E27FC236}">
-                <a16:creationId xmlns:a16="http://schemas.microsoft.com/office/drawing/2014/main" id="{628C1E4A-54B0-4640-BDFE-862ECACBB9D0}"/>
-              </a:ext>
-            </a:extLst>
-          </p:cNvPr>
-          <p:cNvSpPr txBox="1">
-            <a:spLocks/>
-          </p:cNvSpPr>
-          <p:nvPr/>
-        </p:nvSpPr>
-        <p:spPr>
-          <a:xfrm>
-            <a:off x="4516440" y="3851663"/>
-            <a:ext cx="785810" cy="273845"/>
-          </a:xfrm>
-          <a:prstGeom prst="rect">
-            <a:avLst/>
-          </a:prstGeom>
-          <a:noFill/>
-          <a:ln w="9525">
-            <a:noFill/>
-            <a:miter lim="800000"/>
-            <a:headEnd/>
-            <a:tailEnd/>
-          </a:ln>
-        </p:spPr>
-        <p:txBody>
-          <a:bodyPr vert="horz" wrap="square" lIns="0" tIns="0" rIns="0" bIns="0" numCol="1" anchor="t" anchorCtr="0" compatLnSpc="1">
-            <a:prstTxWarp prst="textNoShape">
-              <a:avLst/>
-            </a:prstTxWarp>
-          </a:bodyPr>
-          <a:lstStyle>
-            <a:lvl1pPr algn="l" rtl="0" eaLnBrk="0" fontAlgn="base" hangingPunct="0">
-              <a:lnSpc>
-                <a:spcPct val="114000"/>
-              </a:lnSpc>
-              <a:spcBef>
-                <a:spcPct val="0"/>
-              </a:spcBef>
-              <a:spcAft>
-                <a:spcPct val="0"/>
-              </a:spcAft>
-              <a:defRPr lang="de-DE" sz="1400" kern="1200" noProof="0" dirty="0" smtClean="0">
-                <a:solidFill>
-                  <a:schemeClr val="tx1"/>
-                </a:solidFill>
-                <a:latin typeface="+mn-lt"/>
-                <a:ea typeface="+mn-ea"/>
-                <a:cs typeface="+mn-cs"/>
-              </a:defRPr>
-            </a:lvl1pPr>
-            <a:lvl2pPr marL="176213" indent="-176213" algn="l" rtl="0" eaLnBrk="0" fontAlgn="base" hangingPunct="0">
-              <a:lnSpc>
-                <a:spcPct val="114000"/>
-              </a:lnSpc>
-              <a:spcBef>
-                <a:spcPct val="0"/>
-              </a:spcBef>
-              <a:spcAft>
-                <a:spcPct val="0"/>
-              </a:spcAft>
-              <a:buFont typeface="Arial" charset="0"/>
-              <a:buChar char="•"/>
-              <a:defRPr lang="de-DE" sz="1400" kern="1200" noProof="0" dirty="0" smtClean="0">
-                <a:solidFill>
-                  <a:schemeClr val="tx1"/>
-                </a:solidFill>
-                <a:latin typeface="+mn-lt"/>
-                <a:ea typeface="+mn-ea"/>
-                <a:cs typeface="+mn-cs"/>
-              </a:defRPr>
-            </a:lvl2pPr>
-            <a:lvl3pPr marL="360363" indent="-184150" algn="l" rtl="0" eaLnBrk="0" fontAlgn="base" hangingPunct="0">
-              <a:lnSpc>
-                <a:spcPct val="125000"/>
-              </a:lnSpc>
-              <a:spcBef>
-                <a:spcPct val="0"/>
-              </a:spcBef>
-              <a:spcAft>
-                <a:spcPct val="0"/>
-              </a:spcAft>
-              <a:buFont typeface="Symbol" pitchFamily="18" charset="2"/>
-              <a:buChar char="-"/>
-              <a:defRPr sz="1400" kern="1200">
-                <a:solidFill>
-                  <a:schemeClr val="tx1"/>
-                </a:solidFill>
-                <a:latin typeface="+mn-lt"/>
-                <a:ea typeface="+mn-ea"/>
-                <a:cs typeface="+mn-cs"/>
-              </a:defRPr>
-            </a:lvl3pPr>
-            <a:lvl4pPr marL="538163" indent="-177800" algn="l" rtl="0" eaLnBrk="0" fontAlgn="base" hangingPunct="0">
-              <a:lnSpc>
-                <a:spcPct val="125000"/>
-              </a:lnSpc>
-              <a:spcBef>
-                <a:spcPct val="0"/>
-              </a:spcBef>
-              <a:spcAft>
-                <a:spcPct val="0"/>
-              </a:spcAft>
-              <a:buFont typeface="Symbol" pitchFamily="18" charset="2"/>
-              <a:buChar char="-"/>
-              <a:defRPr sz="1400" kern="1200">
-                <a:solidFill>
-                  <a:schemeClr val="tx1"/>
-                </a:solidFill>
-                <a:latin typeface="+mn-lt"/>
-                <a:ea typeface="+mn-ea"/>
-                <a:cs typeface="+mn-cs"/>
-              </a:defRPr>
-            </a:lvl4pPr>
-            <a:lvl5pPr marL="714375" indent="-176213" algn="l" rtl="0" eaLnBrk="0" fontAlgn="base" hangingPunct="0">
-              <a:lnSpc>
-                <a:spcPct val="125000"/>
-              </a:lnSpc>
-              <a:spcBef>
-                <a:spcPct val="0"/>
-              </a:spcBef>
-              <a:spcAft>
-                <a:spcPct val="0"/>
-              </a:spcAft>
-              <a:buFont typeface="Symbol" pitchFamily="18" charset="2"/>
-              <a:buChar char="-"/>
-              <a:defRPr sz="1400" kern="1200">
-                <a:solidFill>
-                  <a:schemeClr val="tx1"/>
-                </a:solidFill>
-                <a:latin typeface="+mn-lt"/>
-                <a:ea typeface="+mn-ea"/>
-                <a:cs typeface="+mn-cs"/>
-              </a:defRPr>
-            </a:lvl5pPr>
-            <a:lvl6pPr marL="2514600" indent="-228600" algn="l" defTabSz="914400" rtl="0" eaLnBrk="1" latinLnBrk="0" hangingPunct="1">
-              <a:spcBef>
-                <a:spcPct val="20000"/>
-              </a:spcBef>
-              <a:buFont typeface="Arial" pitchFamily="34" charset="0"/>
-              <a:buChar char="•"/>
-              <a:defRPr sz="2000" kern="1200">
-                <a:solidFill>
-                  <a:schemeClr val="tx1"/>
-                </a:solidFill>
-                <a:latin typeface="+mn-lt"/>
-                <a:ea typeface="+mn-ea"/>
-                <a:cs typeface="+mn-cs"/>
-              </a:defRPr>
-            </a:lvl6pPr>
-            <a:lvl7pPr marL="2971800" indent="-228600" algn="l" defTabSz="914400" rtl="0" eaLnBrk="1" latinLnBrk="0" hangingPunct="1">
-              <a:spcBef>
-                <a:spcPct val="20000"/>
-              </a:spcBef>
-              <a:buFont typeface="Arial" pitchFamily="34" charset="0"/>
-              <a:buChar char="•"/>
-              <a:defRPr sz="2000" kern="1200">
-                <a:solidFill>
-                  <a:schemeClr val="tx1"/>
-                </a:solidFill>
-                <a:latin typeface="+mn-lt"/>
-                <a:ea typeface="+mn-ea"/>
-                <a:cs typeface="+mn-cs"/>
-              </a:defRPr>
-            </a:lvl7pPr>
-            <a:lvl8pPr marL="3429000" indent="-228600" algn="l" defTabSz="914400" rtl="0" eaLnBrk="1" latinLnBrk="0" hangingPunct="1">
-              <a:spcBef>
-                <a:spcPct val="20000"/>
-              </a:spcBef>
-              <a:buFont typeface="Arial" pitchFamily="34" charset="0"/>
-              <a:buChar char="•"/>
-              <a:defRPr sz="2000" kern="1200">
-                <a:solidFill>
-                  <a:schemeClr val="tx1"/>
-                </a:solidFill>
-                <a:latin typeface="+mn-lt"/>
-                <a:ea typeface="+mn-ea"/>
-                <a:cs typeface="+mn-cs"/>
-              </a:defRPr>
-            </a:lvl8pPr>
-            <a:lvl9pPr marL="3886200" indent="-228600" algn="l" defTabSz="914400" rtl="0" eaLnBrk="1" latinLnBrk="0" hangingPunct="1">
-              <a:spcBef>
-                <a:spcPct val="20000"/>
-              </a:spcBef>
-              <a:buFont typeface="Arial" pitchFamily="34" charset="0"/>
-              <a:buChar char="•"/>
-              <a:defRPr sz="2000" kern="1200">
-                <a:solidFill>
-                  <a:schemeClr val="tx1"/>
-                </a:solidFill>
-                <a:latin typeface="+mn-lt"/>
-                <a:ea typeface="+mn-ea"/>
-                <a:cs typeface="+mn-cs"/>
-              </a:defRPr>
-            </a:lvl9pPr>
-          </a:lstStyle>
-          <a:p>
-            <a:r>
-              <a:rPr lang="de-DE" dirty="0"/>
-              <a:t>Lösung:</a:t>
-            </a:r>
-          </a:p>
-        </p:txBody>
-      </p:sp>
-      <p:pic>
-        <p:nvPicPr>
-          <p:cNvPr id="16" name="Grafik 15">
-            <a:extLst>
-              <a:ext uri="{FF2B5EF4-FFF2-40B4-BE49-F238E27FC236}">
-                <a16:creationId xmlns:a16="http://schemas.microsoft.com/office/drawing/2014/main" id="{8ECFE15F-FD51-44E3-8E80-AAB4C9EB21BD}"/>
-              </a:ext>
-            </a:extLst>
-          </p:cNvPr>
-          <p:cNvPicPr>
-            <a:picLocks noChangeAspect="1"/>
-          </p:cNvPicPr>
-          <p:nvPr/>
-        </p:nvPicPr>
-        <p:blipFill>
-          <a:blip r:embed="rId4"/>
-          <a:stretch>
-            <a:fillRect/>
-          </a:stretch>
-        </p:blipFill>
-        <p:spPr>
-          <a:xfrm>
-            <a:off x="5391152" y="3604938"/>
-            <a:ext cx="1242586" cy="710049"/>
-          </a:xfrm>
-          <a:prstGeom prst="rect">
-            <a:avLst/>
-          </a:prstGeom>
-        </p:spPr>
-      </p:pic>
-      <p:pic>
-        <p:nvPicPr>
-          <p:cNvPr id="18" name="Grafik 17">
-            <a:extLst>
-              <a:ext uri="{FF2B5EF4-FFF2-40B4-BE49-F238E27FC236}">
-                <a16:creationId xmlns:a16="http://schemas.microsoft.com/office/drawing/2014/main" id="{CA8A5BCC-C3F6-4952-B4B2-0C66DD598A8E}"/>
-              </a:ext>
-            </a:extLst>
-          </p:cNvPr>
-          <p:cNvPicPr>
-            <a:picLocks noChangeAspect="1"/>
-          </p:cNvPicPr>
-          <p:nvPr/>
-        </p:nvPicPr>
-        <p:blipFill>
-          <a:blip r:embed="rId5"/>
-          <a:stretch>
-            <a:fillRect/>
-          </a:stretch>
-        </p:blipFill>
-        <p:spPr>
-          <a:xfrm>
-            <a:off x="5391152" y="2052330"/>
-            <a:ext cx="837998" cy="650551"/>
-          </a:xfrm>
-          <a:prstGeom prst="rect">
-            <a:avLst/>
-          </a:prstGeom>
-        </p:spPr>
-      </p:pic>
-    </p:spTree>
-    <p:extLst>
-      <p:ext uri="{BB962C8B-B14F-4D97-AF65-F5344CB8AC3E}">
-        <p14:creationId xmlns:p14="http://schemas.microsoft.com/office/powerpoint/2010/main" val="401321795"/>
-      </p:ext>
-    </p:extLst>
-  </p:cSld>
-  <p:clrMapOvr>
-    <a:masterClrMapping/>
-  </p:clrMapOvr>
-</p:sld>
-</file>
-
-<file path=ppt/slides/slide11.xml><?xml version="1.0" encoding="utf-8"?>
-<p:sld xmlns:a="http://schemas.openxmlformats.org/drawingml/2006/main" xmlns:r="http://schemas.openxmlformats.org/officeDocument/2006/relationships" xmlns:p="http://schemas.openxmlformats.org/presentationml/2006/main">
-  <p:cSld>
-    <p:spTree>
-      <p:nvGrpSpPr>
-        <p:cNvPr id="1" name=""/>
-        <p:cNvGrpSpPr/>
-        <p:nvPr/>
-      </p:nvGrpSpPr>
-      <p:grpSpPr>
-        <a:xfrm>
-          <a:off x="0" y="0"/>
-          <a:ext cx="0" cy="0"/>
-          <a:chOff x="0" y="0"/>
-          <a:chExt cx="0" cy="0"/>
-        </a:xfrm>
-      </p:grpSpPr>
-      <p:sp>
-        <p:nvSpPr>
-          <p:cNvPr id="2" name="Inhaltsplatzhalter 1"/>
-          <p:cNvSpPr>
-            <a:spLocks noGrp="1"/>
-          </p:cNvSpPr>
-          <p:nvPr>
-            <p:ph idx="1"/>
-          </p:nvPr>
-        </p:nvSpPr>
-        <p:spPr>
-          <a:xfrm>
-            <a:off x="490540" y="1615194"/>
-            <a:ext cx="3788566" cy="273845"/>
-          </a:xfrm>
-        </p:spPr>
-        <p:txBody>
-          <a:bodyPr/>
-          <a:lstStyle/>
-          <a:p>
-            <a:r>
-              <a:rPr lang="de-DE" dirty="0"/>
-              <a:t>sein      eine beliebige Norm auf       dann ist:</a:t>
-            </a:r>
-          </a:p>
-        </p:txBody>
-      </p:sp>
-      <p:sp>
-        <p:nvSpPr>
-          <p:cNvPr id="3" name="Titel 2"/>
-          <p:cNvSpPr>
-            <a:spLocks noGrp="1"/>
-          </p:cNvSpPr>
-          <p:nvPr>
-            <p:ph type="title"/>
-          </p:nvPr>
-        </p:nvSpPr>
-        <p:spPr>
-          <a:xfrm>
-            <a:off x="318009" y="837520"/>
-            <a:ext cx="8508999" cy="380810"/>
-          </a:xfrm>
-        </p:spPr>
-        <p:txBody>
-          <a:bodyPr/>
-          <a:lstStyle/>
-          <a:p>
-            <a:r>
-              <a:rPr lang="de-DE" dirty="0"/>
-              <a:t>Zugehörige Matrixnorm</a:t>
-            </a:r>
-          </a:p>
-        </p:txBody>
-      </p:sp>
-      <p:sp>
-        <p:nvSpPr>
-          <p:cNvPr id="4" name="Foliennummernplatzhalter 3"/>
-          <p:cNvSpPr>
-            <a:spLocks noGrp="1"/>
-          </p:cNvSpPr>
-          <p:nvPr>
-            <p:ph type="sldNum" sz="quarter" idx="11"/>
-          </p:nvPr>
-        </p:nvSpPr>
-        <p:spPr/>
-        <p:txBody>
-          <a:bodyPr/>
-          <a:lstStyle/>
-          <a:p>
-            <a:fld id="{CE58CB1E-F828-4F11-99E0-327109AF9DA4}" type="slidenum">
-              <a:rPr lang="de-DE" smtClean="0"/>
-              <a:pPr/>
-              <a:t>11</a:t>
-            </a:fld>
-            <a:endParaRPr lang="de-DE" dirty="0"/>
-          </a:p>
-        </p:txBody>
-      </p:sp>
-      <p:sp>
-        <p:nvSpPr>
-          <p:cNvPr id="7" name="Fußzeilenplatzhalter 4"/>
-          <p:cNvSpPr>
-            <a:spLocks noGrp="1"/>
-          </p:cNvSpPr>
-          <p:nvPr>
-            <p:ph type="ftr" sz="quarter" idx="12"/>
-          </p:nvPr>
-        </p:nvSpPr>
-        <p:spPr/>
-        <p:txBody>
-          <a:bodyPr/>
-          <a:lstStyle/>
-          <a:p>
-            <a:r>
-              <a:rPr lang="de-DE" sz="1000" dirty="0"/>
-              <a:t>Von </a:t>
-            </a:r>
-            <a:r>
-              <a:rPr lang="de-DE" sz="1000" dirty="0" err="1"/>
-              <a:t>Aleksandre</a:t>
-            </a:r>
-            <a:r>
-              <a:rPr lang="de-DE" sz="1000" dirty="0"/>
-              <a:t> </a:t>
-            </a:r>
-            <a:r>
-              <a:rPr lang="de-DE" sz="1000" dirty="0" err="1"/>
-              <a:t>Kandelaki</a:t>
-            </a:r>
-            <a:r>
-              <a:rPr lang="de-DE" sz="1000" dirty="0"/>
-              <a:t>, Matthias Staritz und Benjamin Liertz</a:t>
-            </a:r>
-          </a:p>
-        </p:txBody>
-      </p:sp>
-      <p:sp>
-        <p:nvSpPr>
-          <p:cNvPr id="11" name="Inhaltsplatzhalter 1">
-            <a:extLst>
-              <a:ext uri="{FF2B5EF4-FFF2-40B4-BE49-F238E27FC236}">
-                <a16:creationId xmlns:a16="http://schemas.microsoft.com/office/drawing/2014/main" id="{50248EC9-836D-4B59-A3DC-0C01D29E621F}"/>
-              </a:ext>
-            </a:extLst>
-          </p:cNvPr>
-          <p:cNvSpPr txBox="1">
-            <a:spLocks/>
-          </p:cNvSpPr>
-          <p:nvPr/>
-        </p:nvSpPr>
-        <p:spPr>
-          <a:xfrm>
-            <a:off x="490540" y="3284101"/>
-            <a:ext cx="4881560" cy="273844"/>
-          </a:xfrm>
-          <a:prstGeom prst="rect">
-            <a:avLst/>
-          </a:prstGeom>
-          <a:noFill/>
-          <a:ln w="9525">
-            <a:noFill/>
-            <a:miter lim="800000"/>
-            <a:headEnd/>
-            <a:tailEnd/>
-          </a:ln>
-        </p:spPr>
-        <p:txBody>
-          <a:bodyPr vert="horz" wrap="square" lIns="0" tIns="0" rIns="0" bIns="0" numCol="1" anchor="t" anchorCtr="0" compatLnSpc="1">
-            <a:prstTxWarp prst="textNoShape">
-              <a:avLst/>
-            </a:prstTxWarp>
-          </a:bodyPr>
-          <a:lstStyle>
-            <a:lvl1pPr algn="l" rtl="0" eaLnBrk="0" fontAlgn="base" hangingPunct="0">
-              <a:lnSpc>
-                <a:spcPct val="114000"/>
-              </a:lnSpc>
-              <a:spcBef>
-                <a:spcPct val="0"/>
-              </a:spcBef>
-              <a:spcAft>
-                <a:spcPct val="0"/>
-              </a:spcAft>
-              <a:defRPr lang="de-DE" sz="1400" kern="1200" noProof="0" dirty="0" smtClean="0">
-                <a:solidFill>
-                  <a:schemeClr val="tx1"/>
-                </a:solidFill>
-                <a:latin typeface="+mn-lt"/>
-                <a:ea typeface="+mn-ea"/>
-                <a:cs typeface="+mn-cs"/>
-              </a:defRPr>
-            </a:lvl1pPr>
-            <a:lvl2pPr marL="176213" indent="-176213" algn="l" rtl="0" eaLnBrk="0" fontAlgn="base" hangingPunct="0">
-              <a:lnSpc>
-                <a:spcPct val="114000"/>
-              </a:lnSpc>
-              <a:spcBef>
-                <a:spcPct val="0"/>
-              </a:spcBef>
-              <a:spcAft>
-                <a:spcPct val="0"/>
-              </a:spcAft>
-              <a:buFont typeface="Arial" charset="0"/>
-              <a:buChar char="•"/>
-              <a:defRPr lang="de-DE" sz="1400" kern="1200" noProof="0" dirty="0" smtClean="0">
-                <a:solidFill>
-                  <a:schemeClr val="tx1"/>
-                </a:solidFill>
-                <a:latin typeface="+mn-lt"/>
-                <a:ea typeface="+mn-ea"/>
-                <a:cs typeface="+mn-cs"/>
-              </a:defRPr>
-            </a:lvl2pPr>
-            <a:lvl3pPr marL="360363" indent="-184150" algn="l" rtl="0" eaLnBrk="0" fontAlgn="base" hangingPunct="0">
-              <a:lnSpc>
-                <a:spcPct val="125000"/>
-              </a:lnSpc>
-              <a:spcBef>
-                <a:spcPct val="0"/>
-              </a:spcBef>
-              <a:spcAft>
-                <a:spcPct val="0"/>
-              </a:spcAft>
-              <a:buFont typeface="Symbol" pitchFamily="18" charset="2"/>
-              <a:buChar char="-"/>
-              <a:defRPr sz="1400" kern="1200">
-                <a:solidFill>
-                  <a:schemeClr val="tx1"/>
-                </a:solidFill>
-                <a:latin typeface="+mn-lt"/>
-                <a:ea typeface="+mn-ea"/>
-                <a:cs typeface="+mn-cs"/>
-              </a:defRPr>
-            </a:lvl3pPr>
-            <a:lvl4pPr marL="538163" indent="-177800" algn="l" rtl="0" eaLnBrk="0" fontAlgn="base" hangingPunct="0">
-              <a:lnSpc>
-                <a:spcPct val="125000"/>
-              </a:lnSpc>
-              <a:spcBef>
-                <a:spcPct val="0"/>
-              </a:spcBef>
-              <a:spcAft>
-                <a:spcPct val="0"/>
-              </a:spcAft>
-              <a:buFont typeface="Symbol" pitchFamily="18" charset="2"/>
-              <a:buChar char="-"/>
-              <a:defRPr sz="1400" kern="1200">
-                <a:solidFill>
-                  <a:schemeClr val="tx1"/>
-                </a:solidFill>
-                <a:latin typeface="+mn-lt"/>
-                <a:ea typeface="+mn-ea"/>
-                <a:cs typeface="+mn-cs"/>
-              </a:defRPr>
-            </a:lvl4pPr>
-            <a:lvl5pPr marL="714375" indent="-176213" algn="l" rtl="0" eaLnBrk="0" fontAlgn="base" hangingPunct="0">
-              <a:lnSpc>
-                <a:spcPct val="125000"/>
-              </a:lnSpc>
-              <a:spcBef>
-                <a:spcPct val="0"/>
-              </a:spcBef>
-              <a:spcAft>
-                <a:spcPct val="0"/>
-              </a:spcAft>
-              <a:buFont typeface="Symbol" pitchFamily="18" charset="2"/>
-              <a:buChar char="-"/>
-              <a:defRPr sz="1400" kern="1200">
-                <a:solidFill>
-                  <a:schemeClr val="tx1"/>
-                </a:solidFill>
-                <a:latin typeface="+mn-lt"/>
-                <a:ea typeface="+mn-ea"/>
-                <a:cs typeface="+mn-cs"/>
-              </a:defRPr>
-            </a:lvl5pPr>
-            <a:lvl6pPr marL="2514600" indent="-228600" algn="l" defTabSz="914400" rtl="0" eaLnBrk="1" latinLnBrk="0" hangingPunct="1">
-              <a:spcBef>
-                <a:spcPct val="20000"/>
-              </a:spcBef>
-              <a:buFont typeface="Arial" pitchFamily="34" charset="0"/>
-              <a:buChar char="•"/>
-              <a:defRPr sz="2000" kern="1200">
-                <a:solidFill>
-                  <a:schemeClr val="tx1"/>
-                </a:solidFill>
-                <a:latin typeface="+mn-lt"/>
-                <a:ea typeface="+mn-ea"/>
-                <a:cs typeface="+mn-cs"/>
-              </a:defRPr>
-            </a:lvl6pPr>
-            <a:lvl7pPr marL="2971800" indent="-228600" algn="l" defTabSz="914400" rtl="0" eaLnBrk="1" latinLnBrk="0" hangingPunct="1">
-              <a:spcBef>
-                <a:spcPct val="20000"/>
-              </a:spcBef>
-              <a:buFont typeface="Arial" pitchFamily="34" charset="0"/>
-              <a:buChar char="•"/>
-              <a:defRPr sz="2000" kern="1200">
-                <a:solidFill>
-                  <a:schemeClr val="tx1"/>
-                </a:solidFill>
-                <a:latin typeface="+mn-lt"/>
-                <a:ea typeface="+mn-ea"/>
-                <a:cs typeface="+mn-cs"/>
-              </a:defRPr>
-            </a:lvl7pPr>
-            <a:lvl8pPr marL="3429000" indent="-228600" algn="l" defTabSz="914400" rtl="0" eaLnBrk="1" latinLnBrk="0" hangingPunct="1">
-              <a:spcBef>
-                <a:spcPct val="20000"/>
-              </a:spcBef>
-              <a:buFont typeface="Arial" pitchFamily="34" charset="0"/>
-              <a:buChar char="•"/>
-              <a:defRPr sz="2000" kern="1200">
-                <a:solidFill>
-                  <a:schemeClr val="tx1"/>
-                </a:solidFill>
-                <a:latin typeface="+mn-lt"/>
-                <a:ea typeface="+mn-ea"/>
-                <a:cs typeface="+mn-cs"/>
-              </a:defRPr>
-            </a:lvl8pPr>
-            <a:lvl9pPr marL="3886200" indent="-228600" algn="l" defTabSz="914400" rtl="0" eaLnBrk="1" latinLnBrk="0" hangingPunct="1">
-              <a:spcBef>
-                <a:spcPct val="20000"/>
-              </a:spcBef>
-              <a:buFont typeface="Arial" pitchFamily="34" charset="0"/>
-              <a:buChar char="•"/>
-              <a:defRPr sz="2000" kern="1200">
-                <a:solidFill>
-                  <a:schemeClr val="tx1"/>
-                </a:solidFill>
-                <a:latin typeface="+mn-lt"/>
-                <a:ea typeface="+mn-ea"/>
-                <a:cs typeface="+mn-cs"/>
-              </a:defRPr>
-            </a:lvl9pPr>
-          </a:lstStyle>
-          <a:p>
-            <a:r>
-              <a:rPr lang="de-DE" dirty="0"/>
-              <a:t>Norm von	        kann abgeschätzt werden durch:</a:t>
-            </a:r>
-          </a:p>
-        </p:txBody>
-      </p:sp>
-      <p:pic>
-        <p:nvPicPr>
-          <p:cNvPr id="9" name="Grafik 8">
-            <a:extLst>
-              <a:ext uri="{FF2B5EF4-FFF2-40B4-BE49-F238E27FC236}">
-                <a16:creationId xmlns:a16="http://schemas.microsoft.com/office/drawing/2014/main" id="{8DEFA4B8-B24F-4D6F-BE3E-FE4D5C720F16}"/>
-              </a:ext>
-            </a:extLst>
-          </p:cNvPr>
-          <p:cNvPicPr>
-            <a:picLocks noChangeAspect="1"/>
-          </p:cNvPicPr>
-          <p:nvPr/>
-        </p:nvPicPr>
-        <p:blipFill>
-          <a:blip r:embed="rId2"/>
-          <a:stretch>
-            <a:fillRect/>
-          </a:stretch>
-        </p:blipFill>
-        <p:spPr>
-          <a:xfrm>
-            <a:off x="455475" y="1903367"/>
-            <a:ext cx="4033975" cy="726034"/>
-          </a:xfrm>
-          <a:prstGeom prst="rect">
-            <a:avLst/>
-          </a:prstGeom>
-        </p:spPr>
-      </p:pic>
-      <p:pic>
-        <p:nvPicPr>
-          <p:cNvPr id="13" name="Grafik 12">
-            <a:extLst>
-              <a:ext uri="{FF2B5EF4-FFF2-40B4-BE49-F238E27FC236}">
-                <a16:creationId xmlns:a16="http://schemas.microsoft.com/office/drawing/2014/main" id="{89DF4E9D-0E79-4883-8148-632421C64468}"/>
-              </a:ext>
-            </a:extLst>
-          </p:cNvPr>
-          <p:cNvPicPr>
-            <a:picLocks noChangeAspect="1"/>
-          </p:cNvPicPr>
-          <p:nvPr/>
-        </p:nvPicPr>
-        <p:blipFill>
-          <a:blip r:embed="rId3"/>
-          <a:stretch>
-            <a:fillRect/>
-          </a:stretch>
-        </p:blipFill>
-        <p:spPr>
-          <a:xfrm>
-            <a:off x="490540" y="3813632"/>
-            <a:ext cx="3520851" cy="341150"/>
-          </a:xfrm>
-          <a:prstGeom prst="rect">
-            <a:avLst/>
-          </a:prstGeom>
-        </p:spPr>
-      </p:pic>
-      <p:pic>
-        <p:nvPicPr>
-          <p:cNvPr id="17" name="Grafik 16">
-            <a:extLst>
-              <a:ext uri="{FF2B5EF4-FFF2-40B4-BE49-F238E27FC236}">
-                <a16:creationId xmlns:a16="http://schemas.microsoft.com/office/drawing/2014/main" id="{2B4005DD-5D38-4AA4-A7F0-BC7F584CC10F}"/>
-              </a:ext>
-            </a:extLst>
-          </p:cNvPr>
-          <p:cNvPicPr>
-            <a:picLocks noChangeAspect="1"/>
-          </p:cNvPicPr>
-          <p:nvPr/>
-        </p:nvPicPr>
-        <p:blipFill>
-          <a:blip r:embed="rId4"/>
-          <a:stretch>
-            <a:fillRect/>
-          </a:stretch>
-        </p:blipFill>
-        <p:spPr>
-          <a:xfrm>
-            <a:off x="1304775" y="3329604"/>
-            <a:ext cx="442783" cy="215641"/>
-          </a:xfrm>
-          <a:prstGeom prst="rect">
-            <a:avLst/>
-          </a:prstGeom>
-        </p:spPr>
-      </p:pic>
-      <p:pic>
-        <p:nvPicPr>
-          <p:cNvPr id="19" name="Grafik 18">
-            <a:extLst>
-              <a:ext uri="{FF2B5EF4-FFF2-40B4-BE49-F238E27FC236}">
-                <a16:creationId xmlns:a16="http://schemas.microsoft.com/office/drawing/2014/main" id="{7D7568D2-FBAA-48E3-90BE-3C5E90807BFC}"/>
-              </a:ext>
-            </a:extLst>
-          </p:cNvPr>
-          <p:cNvPicPr>
-            <a:picLocks noChangeAspect="1"/>
-          </p:cNvPicPr>
-          <p:nvPr/>
-        </p:nvPicPr>
-        <p:blipFill>
-          <a:blip r:embed="rId5"/>
-          <a:stretch>
-            <a:fillRect/>
-          </a:stretch>
-        </p:blipFill>
-        <p:spPr>
-          <a:xfrm>
-            <a:off x="844471" y="1640444"/>
-            <a:ext cx="222329" cy="194538"/>
-          </a:xfrm>
-          <a:prstGeom prst="rect">
-            <a:avLst/>
-          </a:prstGeom>
-        </p:spPr>
-      </p:pic>
-      <p:pic>
-        <p:nvPicPr>
-          <p:cNvPr id="21" name="Grafik 20">
-            <a:extLst>
-              <a:ext uri="{FF2B5EF4-FFF2-40B4-BE49-F238E27FC236}">
-                <a16:creationId xmlns:a16="http://schemas.microsoft.com/office/drawing/2014/main" id="{37303E8D-EAD5-4879-9677-DD35B2071667}"/>
-              </a:ext>
-            </a:extLst>
-          </p:cNvPr>
-          <p:cNvPicPr>
-            <a:picLocks noChangeAspect="1"/>
-          </p:cNvPicPr>
-          <p:nvPr/>
-        </p:nvPicPr>
-        <p:blipFill>
-          <a:blip r:embed="rId6"/>
-          <a:stretch>
-            <a:fillRect/>
-          </a:stretch>
-        </p:blipFill>
-        <p:spPr>
-          <a:xfrm>
-            <a:off x="3044358" y="1651327"/>
-            <a:ext cx="230153" cy="159118"/>
-          </a:xfrm>
-          <a:prstGeom prst="rect">
-            <a:avLst/>
-          </a:prstGeom>
-        </p:spPr>
-      </p:pic>
-    </p:spTree>
-    <p:extLst>
-      <p:ext uri="{BB962C8B-B14F-4D97-AF65-F5344CB8AC3E}">
-        <p14:creationId xmlns:p14="http://schemas.microsoft.com/office/powerpoint/2010/main" val="2820011747"/>
-      </p:ext>
-    </p:extLst>
-  </p:cSld>
-  <p:clrMapOvr>
-    <a:masterClrMapping/>
-  </p:clrMapOvr>
-</p:sld>
-</file>
-
-<file path=ppt/slides/slide12.xml><?xml version="1.0" encoding="utf-8"?>
-<p:sld xmlns:a="http://schemas.openxmlformats.org/drawingml/2006/main" xmlns:r="http://schemas.openxmlformats.org/officeDocument/2006/relationships" xmlns:p="http://schemas.openxmlformats.org/presentationml/2006/main">
-  <p:cSld>
-    <p:spTree>
-      <p:nvGrpSpPr>
-        <p:cNvPr id="1" name=""/>
-        <p:cNvGrpSpPr/>
-        <p:nvPr/>
-      </p:nvGrpSpPr>
-      <p:grpSpPr>
-        <a:xfrm>
-          <a:off x="0" y="0"/>
-          <a:ext cx="0" cy="0"/>
-          <a:chOff x="0" y="0"/>
-          <a:chExt cx="0" cy="0"/>
-        </a:xfrm>
-      </p:grpSpPr>
-      <p:sp>
-        <p:nvSpPr>
-          <p:cNvPr id="2" name="Inhaltsplatzhalter 1"/>
-          <p:cNvSpPr>
-            <a:spLocks noGrp="1"/>
-          </p:cNvSpPr>
-          <p:nvPr>
-            <p:ph idx="1"/>
-          </p:nvPr>
-        </p:nvSpPr>
-        <p:spPr>
-          <a:xfrm>
-            <a:off x="519113" y="1544021"/>
-            <a:ext cx="1566861" cy="273845"/>
-          </a:xfrm>
-        </p:spPr>
-        <p:txBody>
-          <a:bodyPr/>
-          <a:lstStyle/>
-          <a:p>
-            <a:r>
-              <a:rPr lang="de-DE" dirty="0"/>
-              <a:t>Relativer Fehler:</a:t>
-            </a:r>
-          </a:p>
-        </p:txBody>
-      </p:sp>
-      <p:sp>
-        <p:nvSpPr>
-          <p:cNvPr id="3" name="Titel 2"/>
-          <p:cNvSpPr>
-            <a:spLocks noGrp="1"/>
-          </p:cNvSpPr>
-          <p:nvPr>
-            <p:ph type="title"/>
-          </p:nvPr>
-        </p:nvSpPr>
-        <p:spPr>
-          <a:xfrm>
-            <a:off x="318009" y="837520"/>
-            <a:ext cx="8508999" cy="380810"/>
-          </a:xfrm>
-        </p:spPr>
-        <p:txBody>
-          <a:bodyPr/>
-          <a:lstStyle/>
-          <a:p>
-            <a:r>
-              <a:rPr lang="de-DE" dirty="0"/>
-              <a:t>Relativer Fehler</a:t>
-            </a:r>
-          </a:p>
-        </p:txBody>
-      </p:sp>
-      <p:sp>
-        <p:nvSpPr>
-          <p:cNvPr id="4" name="Foliennummernplatzhalter 3"/>
-          <p:cNvSpPr>
-            <a:spLocks noGrp="1"/>
-          </p:cNvSpPr>
-          <p:nvPr>
-            <p:ph type="sldNum" sz="quarter" idx="11"/>
-          </p:nvPr>
-        </p:nvSpPr>
-        <p:spPr/>
-        <p:txBody>
-          <a:bodyPr/>
-          <a:lstStyle/>
-          <a:p>
-            <a:fld id="{CE58CB1E-F828-4F11-99E0-327109AF9DA4}" type="slidenum">
-              <a:rPr lang="de-DE" smtClean="0"/>
-              <a:pPr/>
-              <a:t>12</a:t>
             </a:fld>
             <a:endParaRPr lang="de-DE" dirty="0"/>
           </a:p>
@@ -9904,7 +8428,7 @@
 </p:sld>
 </file>
 
-<file path=ppt/slides/slide13.xml><?xml version="1.0" encoding="utf-8"?>
+<file path=ppt/slides/slide11.xml><?xml version="1.0" encoding="utf-8"?>
 <p:sld xmlns:a="http://schemas.openxmlformats.org/drawingml/2006/main" xmlns:r="http://schemas.openxmlformats.org/officeDocument/2006/relationships" xmlns:p="http://schemas.openxmlformats.org/presentationml/2006/main">
   <p:cSld>
     <p:spTree>
@@ -9966,7 +8490,7 @@
             <a:fld id="{CE58CB1E-F828-4F11-99E0-327109AF9DA4}" type="slidenum">
               <a:rPr lang="de-DE" smtClean="0"/>
               <a:pPr/>
-              <a:t>13</a:t>
+              <a:t>11</a:t>
             </a:fld>
             <a:endParaRPr lang="de-DE" dirty="0"/>
           </a:p>
@@ -10740,7 +9264,7 @@
 </p:sld>
 </file>
 
-<file path=ppt/slides/slide14.xml><?xml version="1.0" encoding="utf-8"?>
+<file path=ppt/slides/slide12.xml><?xml version="1.0" encoding="utf-8"?>
 <p:sld xmlns:a="http://schemas.openxmlformats.org/drawingml/2006/main" xmlns:r="http://schemas.openxmlformats.org/officeDocument/2006/relationships" xmlns:p="http://schemas.openxmlformats.org/presentationml/2006/main">
   <p:cSld>
     <p:spTree>
@@ -10802,7 +9326,7 @@
             <a:fld id="{CE58CB1E-F828-4F11-99E0-327109AF9DA4}" type="slidenum">
               <a:rPr lang="de-DE" smtClean="0"/>
               <a:pPr/>
-              <a:t>14</a:t>
+              <a:t>12</a:t>
             </a:fld>
             <a:endParaRPr lang="de-DE" dirty="0"/>
           </a:p>
@@ -11576,7 +10100,7 @@
 </p:sld>
 </file>
 
-<file path=ppt/slides/slide15.xml><?xml version="1.0" encoding="utf-8"?>
+<file path=ppt/slides/slide13.xml><?xml version="1.0" encoding="utf-8"?>
 <p:sld xmlns:a="http://schemas.openxmlformats.org/drawingml/2006/main" xmlns:r="http://schemas.openxmlformats.org/officeDocument/2006/relationships" xmlns:p="http://schemas.openxmlformats.org/presentationml/2006/main">
   <p:cSld>
     <p:spTree>
@@ -11956,42 +10480,9 @@
             <a:fld id="{CE58CB1E-F828-4F11-99E0-327109AF9DA4}" type="slidenum">
               <a:rPr lang="de-DE" smtClean="0"/>
               <a:pPr/>
-              <a:t>15</a:t>
+              <a:t>13</a:t>
             </a:fld>
             <a:endParaRPr lang="de-DE" dirty="0"/>
-          </a:p>
-        </p:txBody>
-      </p:sp>
-      <p:sp>
-        <p:nvSpPr>
-          <p:cNvPr id="5" name="Footer Placeholder 4">
-            <a:extLst>
-              <a:ext uri="{FF2B5EF4-FFF2-40B4-BE49-F238E27FC236}">
-                <a16:creationId xmlns:a16="http://schemas.microsoft.com/office/drawing/2014/main" id="{40CDB506-E093-4295-8713-2DFFE229E90F}"/>
-              </a:ext>
-            </a:extLst>
-          </p:cNvPr>
-          <p:cNvSpPr>
-            <a:spLocks noGrp="1"/>
-          </p:cNvSpPr>
-          <p:nvPr>
-            <p:ph type="ftr" sz="quarter" idx="12"/>
-          </p:nvPr>
-        </p:nvSpPr>
-        <p:spPr/>
-        <p:txBody>
-          <a:bodyPr/>
-          <a:lstStyle/>
-          <a:p>
-            <a:pPr>
-              <a:spcAft>
-                <a:spcPts val="600"/>
-              </a:spcAft>
-            </a:pPr>
-            <a:r>
-              <a:rPr lang="de-DE" dirty="0"/>
-              <a:t>Von Aleksandre Kandelaki, Matthias Staritz und Benjamin Liertz</a:t>
-            </a:r>
           </a:p>
         </p:txBody>
       </p:sp>
@@ -13611,6 +12102,55 @@
           </a:fontRef>
         </p:style>
       </p:cxnSp>
+      <p:sp>
+        <p:nvSpPr>
+          <p:cNvPr id="35" name="Fußzeilenplatzhalter 4">
+            <a:extLst>
+              <a:ext uri="{FF2B5EF4-FFF2-40B4-BE49-F238E27FC236}">
+                <a16:creationId xmlns:a16="http://schemas.microsoft.com/office/drawing/2014/main" id="{971BC3B1-F48B-4A19-B5D4-3FD029C2BF30}"/>
+              </a:ext>
+            </a:extLst>
+          </p:cNvPr>
+          <p:cNvSpPr>
+            <a:spLocks noGrp="1"/>
+          </p:cNvSpPr>
+          <p:nvPr>
+            <p:ph type="ftr" sz="quarter" idx="12"/>
+          </p:nvPr>
+        </p:nvSpPr>
+        <p:spPr>
+          <a:xfrm>
+            <a:off x="311162" y="4854985"/>
+            <a:ext cx="6464280" cy="273844"/>
+          </a:xfrm>
+        </p:spPr>
+        <p:txBody>
+          <a:bodyPr/>
+          <a:lstStyle/>
+          <a:p>
+            <a:r>
+              <a:rPr lang="de-DE" sz="1000" dirty="0"/>
+              <a:t>Von </a:t>
+            </a:r>
+            <a:r>
+              <a:rPr lang="de-DE" sz="1000" dirty="0" err="1"/>
+              <a:t>Aleksandre</a:t>
+            </a:r>
+            <a:r>
+              <a:rPr lang="de-DE" sz="1000" dirty="0"/>
+              <a:t> </a:t>
+            </a:r>
+            <a:r>
+              <a:rPr lang="de-DE" sz="1000" dirty="0" err="1"/>
+              <a:t>Kandelaki</a:t>
+            </a:r>
+            <a:r>
+              <a:rPr lang="de-DE" sz="1000" dirty="0"/>
+              <a:t>, Matthias Staritz und Benjamin Liertz</a:t>
+            </a:r>
+          </a:p>
+        </p:txBody>
+      </p:sp>
     </p:spTree>
     <p:extLst>
       <p:ext uri="{BB962C8B-B14F-4D97-AF65-F5344CB8AC3E}">
@@ -13624,7 +12164,7 @@
 </p:sld>
 </file>
 
-<file path=ppt/slides/slide16.xml><?xml version="1.0" encoding="utf-8"?>
+<file path=ppt/slides/slide14.xml><?xml version="1.0" encoding="utf-8"?>
 <p:sld xmlns:a="http://schemas.openxmlformats.org/drawingml/2006/main" xmlns:r="http://schemas.openxmlformats.org/officeDocument/2006/relationships" xmlns:p="http://schemas.openxmlformats.org/presentationml/2006/main">
   <p:cSld>
     <p:spTree>
@@ -13764,7 +12304,7 @@
                   <a:spcPts val="600"/>
                 </a:spcAft>
               </a:pPr>
-              <a:t>16</a:t>
+              <a:t>14</a:t>
             </a:fld>
             <a:endParaRPr lang="de-DE"/>
           </a:p>
@@ -13772,12 +12312,18 @@
       </p:sp>
       <p:sp>
         <p:nvSpPr>
-          <p:cNvPr id="7" name="Fußzeilenplatzhalter 4"/>
+          <p:cNvPr id="9" name="Fußzeilenplatzhalter 4">
+            <a:extLst>
+              <a:ext uri="{FF2B5EF4-FFF2-40B4-BE49-F238E27FC236}">
+                <a16:creationId xmlns:a16="http://schemas.microsoft.com/office/drawing/2014/main" id="{B38EC38A-BED3-45A7-AD4A-D7ED19FB575E}"/>
+              </a:ext>
+            </a:extLst>
+          </p:cNvPr>
           <p:cNvSpPr>
             <a:spLocks noGrp="1"/>
           </p:cNvSpPr>
           <p:nvPr>
-            <p:ph type="ftr" sz="quarter" idx="4294967295"/>
+            <p:ph type="ftr" sz="quarter" idx="12"/>
           </p:nvPr>
         </p:nvSpPr>
         <p:spPr>
@@ -13787,19 +12333,28 @@
           </a:xfrm>
         </p:spPr>
         <p:txBody>
-          <a:bodyPr anchor="ctr">
-            <a:normAutofit/>
-          </a:bodyPr>
+          <a:bodyPr/>
           <a:lstStyle/>
           <a:p>
-            <a:pPr>
-              <a:spcAft>
-                <a:spcPts val="600"/>
-              </a:spcAft>
-            </a:pPr>
-            <a:r>
-              <a:rPr lang="de-DE" dirty="0"/>
-              <a:t>Von Aleksandre Kandelaki, Matthias Staritz und Benjamin Liertz</a:t>
+            <a:r>
+              <a:rPr lang="de-DE" sz="1000" dirty="0"/>
+              <a:t>Von </a:t>
+            </a:r>
+            <a:r>
+              <a:rPr lang="de-DE" sz="1000" dirty="0" err="1"/>
+              <a:t>Aleksandre</a:t>
+            </a:r>
+            <a:r>
+              <a:rPr lang="de-DE" sz="1000" dirty="0"/>
+              <a:t> </a:t>
+            </a:r>
+            <a:r>
+              <a:rPr lang="de-DE" sz="1000" dirty="0" err="1"/>
+              <a:t>Kandelaki</a:t>
+            </a:r>
+            <a:r>
+              <a:rPr lang="de-DE" sz="1000" dirty="0"/>
+              <a:t>, Matthias Staritz und Benjamin Liertz</a:t>
             </a:r>
           </a:p>
         </p:txBody>
@@ -13817,7 +12372,7 @@
 </p:sld>
 </file>
 
-<file path=ppt/slides/slide17.xml><?xml version="1.0" encoding="utf-8"?>
+<file path=ppt/slides/slide15.xml><?xml version="1.0" encoding="utf-8"?>
 <p:sld xmlns:a="http://schemas.openxmlformats.org/drawingml/2006/main" xmlns:r="http://schemas.openxmlformats.org/officeDocument/2006/relationships" xmlns:p="http://schemas.openxmlformats.org/presentationml/2006/main">
   <p:cSld>
     <p:spTree>
@@ -13858,38 +12413,9 @@
             <a:fld id="{CE58CB1E-F828-4F11-99E0-327109AF9DA4}" type="slidenum">
               <a:rPr lang="de-DE" smtClean="0"/>
               <a:pPr/>
-              <a:t>17</a:t>
+              <a:t>15</a:t>
             </a:fld>
             <a:endParaRPr lang="de-DE" dirty="0"/>
-          </a:p>
-        </p:txBody>
-      </p:sp>
-      <p:sp>
-        <p:nvSpPr>
-          <p:cNvPr id="5" name="Footer Placeholder 4">
-            <a:extLst>
-              <a:ext uri="{FF2B5EF4-FFF2-40B4-BE49-F238E27FC236}">
-                <a16:creationId xmlns:a16="http://schemas.microsoft.com/office/drawing/2014/main" id="{27C66E76-4D91-4B9A-B26A-B55E2946FAFE}"/>
-              </a:ext>
-            </a:extLst>
-          </p:cNvPr>
-          <p:cNvSpPr>
-            <a:spLocks noGrp="1"/>
-          </p:cNvSpPr>
-          <p:nvPr>
-            <p:ph type="ftr" sz="quarter" idx="12"/>
-          </p:nvPr>
-        </p:nvSpPr>
-        <p:spPr/>
-        <p:txBody>
-          <a:bodyPr/>
-          <a:lstStyle/>
-          <a:p>
-            <a:r>
-              <a:rPr lang="de-DE"/>
-              <a:t>Dr. rer. nat. Erika Mustermann (TUM) | kann beliebig erweitert werden | Infos mit Strich trennen</a:t>
-            </a:r>
-            <a:endParaRPr lang="en-US" dirty="0"/>
           </a:p>
         </p:txBody>
       </p:sp>
@@ -14578,6 +13104,55 @@
           </a:graphicData>
         </a:graphic>
       </p:graphicFrame>
+      <p:sp>
+        <p:nvSpPr>
+          <p:cNvPr id="7" name="Fußzeilenplatzhalter 4">
+            <a:extLst>
+              <a:ext uri="{FF2B5EF4-FFF2-40B4-BE49-F238E27FC236}">
+                <a16:creationId xmlns:a16="http://schemas.microsoft.com/office/drawing/2014/main" id="{BE32EE82-1334-4F51-A6C2-4B660D5C99A7}"/>
+              </a:ext>
+            </a:extLst>
+          </p:cNvPr>
+          <p:cNvSpPr>
+            <a:spLocks noGrp="1"/>
+          </p:cNvSpPr>
+          <p:nvPr>
+            <p:ph type="ftr" sz="quarter" idx="12"/>
+          </p:nvPr>
+        </p:nvSpPr>
+        <p:spPr>
+          <a:xfrm>
+            <a:off x="311162" y="4854985"/>
+            <a:ext cx="6464280" cy="273844"/>
+          </a:xfrm>
+        </p:spPr>
+        <p:txBody>
+          <a:bodyPr/>
+          <a:lstStyle/>
+          <a:p>
+            <a:r>
+              <a:rPr lang="de-DE" sz="1000" dirty="0"/>
+              <a:t>Von </a:t>
+            </a:r>
+            <a:r>
+              <a:rPr lang="de-DE" sz="1000" dirty="0" err="1"/>
+              <a:t>Aleksandre</a:t>
+            </a:r>
+            <a:r>
+              <a:rPr lang="de-DE" sz="1000" dirty="0"/>
+              <a:t> </a:t>
+            </a:r>
+            <a:r>
+              <a:rPr lang="de-DE" sz="1000" dirty="0" err="1"/>
+              <a:t>Kandelaki</a:t>
+            </a:r>
+            <a:r>
+              <a:rPr lang="de-DE" sz="1000" dirty="0"/>
+              <a:t>, Matthias Staritz und Benjamin Liertz</a:t>
+            </a:r>
+          </a:p>
+        </p:txBody>
+      </p:sp>
     </p:spTree>
     <p:extLst>
       <p:ext uri="{BB962C8B-B14F-4D97-AF65-F5344CB8AC3E}">
@@ -14591,7 +13166,7 @@
 </p:sld>
 </file>
 
-<file path=ppt/slides/slide18.xml><?xml version="1.0" encoding="utf-8"?>
+<file path=ppt/slides/slide16.xml><?xml version="1.0" encoding="utf-8"?>
 <p:sld xmlns:a="http://schemas.openxmlformats.org/drawingml/2006/main" xmlns:r="http://schemas.openxmlformats.org/officeDocument/2006/relationships" xmlns:p="http://schemas.openxmlformats.org/presentationml/2006/main">
   <p:cSld>
     <p:spTree>
@@ -14630,6 +13205,9 @@
           <a:lstStyle/>
           <a:p>
             <a:pPr marL="285750" indent="-285750">
+              <a:lnSpc>
+                <a:spcPct val="100000"/>
+              </a:lnSpc>
               <a:buFont typeface="Arial" panose="020B0604020202020204" pitchFamily="34" charset="0"/>
               <a:buChar char="•"/>
             </a:pPr>
@@ -14637,6 +13215,9 @@
           </a:p>
           <a:p>
             <a:pPr marL="285750" indent="-285750">
+              <a:lnSpc>
+                <a:spcPct val="100000"/>
+              </a:lnSpc>
               <a:buFont typeface="Arial" panose="020B0604020202020204" pitchFamily="34" charset="0"/>
               <a:buChar char="•"/>
             </a:pPr>
@@ -14654,7 +13235,7 @@
             </a:r>
             <a:r>
               <a:rPr lang="en-US" dirty="0" err="1"/>
-              <a:t>Zerlegt</a:t>
+              <a:t>zerlegt</a:t>
             </a:r>
             <a:r>
               <a:rPr lang="en-US" dirty="0"/>
@@ -14684,6 +13265,9 @@
           </a:p>
           <a:p>
             <a:pPr marL="285750" indent="-285750">
+              <a:lnSpc>
+                <a:spcPct val="100000"/>
+              </a:lnSpc>
               <a:buFont typeface="Arial" panose="020B0604020202020204" pitchFamily="34" charset="0"/>
               <a:buChar char="•"/>
             </a:pPr>
@@ -14691,6 +13275,9 @@
           </a:p>
           <a:p>
             <a:pPr marL="285750" indent="-285750">
+              <a:lnSpc>
+                <a:spcPct val="100000"/>
+              </a:lnSpc>
               <a:buFont typeface="Arial" panose="020B0604020202020204" pitchFamily="34" charset="0"/>
               <a:buChar char="•"/>
             </a:pPr>
@@ -14754,6 +13341,9 @@
           </a:p>
           <a:p>
             <a:pPr marL="285750" indent="-285750">
+              <a:lnSpc>
+                <a:spcPct val="100000"/>
+              </a:lnSpc>
               <a:buFont typeface="Arial" panose="020B0604020202020204" pitchFamily="34" charset="0"/>
               <a:buChar char="•"/>
             </a:pPr>
@@ -14761,6 +13351,9 @@
           </a:p>
           <a:p>
             <a:pPr marL="285750" indent="-285750">
+              <a:lnSpc>
+                <a:spcPct val="100000"/>
+              </a:lnSpc>
               <a:buFont typeface="Arial" panose="020B0604020202020204" pitchFamily="34" charset="0"/>
               <a:buChar char="•"/>
             </a:pPr>
@@ -14799,6 +13392,9 @@
           </a:p>
           <a:p>
             <a:pPr marL="285750" indent="-285750">
+              <a:lnSpc>
+                <a:spcPct val="100000"/>
+              </a:lnSpc>
               <a:buFont typeface="Arial" panose="020B0604020202020204" pitchFamily="34" charset="0"/>
               <a:buChar char="•"/>
             </a:pPr>
@@ -14806,6 +13402,9 @@
           </a:p>
           <a:p>
             <a:pPr marL="285750" indent="-285750">
+              <a:lnSpc>
+                <a:spcPct val="100000"/>
+              </a:lnSpc>
               <a:buFont typeface="Arial" panose="020B0604020202020204" pitchFamily="34" charset="0"/>
               <a:buChar char="•"/>
             </a:pPr>
@@ -14816,6 +13415,9 @@
           </a:p>
           <a:p>
             <a:pPr marL="285750" indent="-285750">
+              <a:lnSpc>
+                <a:spcPct val="100000"/>
+              </a:lnSpc>
               <a:buFont typeface="Arial" panose="020B0604020202020204" pitchFamily="34" charset="0"/>
               <a:buChar char="•"/>
             </a:pPr>
@@ -14823,6 +13425,9 @@
           </a:p>
           <a:p>
             <a:pPr marL="285750" indent="-285750">
+              <a:lnSpc>
+                <a:spcPct val="100000"/>
+              </a:lnSpc>
               <a:buFont typeface="Arial" panose="020B0604020202020204" pitchFamily="34" charset="0"/>
               <a:buChar char="•"/>
             </a:pPr>
@@ -14833,6 +13438,9 @@
           </a:p>
           <a:p>
             <a:pPr marL="285750" indent="-285750">
+              <a:lnSpc>
+                <a:spcPct val="100000"/>
+              </a:lnSpc>
               <a:buFont typeface="Arial" panose="020B0604020202020204" pitchFamily="34" charset="0"/>
               <a:buChar char="•"/>
             </a:pPr>
@@ -14840,6 +13448,9 @@
           </a:p>
           <a:p>
             <a:pPr marL="285750" indent="-285750">
+              <a:lnSpc>
+                <a:spcPct val="100000"/>
+              </a:lnSpc>
               <a:buFont typeface="Arial" panose="020B0604020202020204" pitchFamily="34" charset="0"/>
               <a:buChar char="•"/>
             </a:pPr>
@@ -14850,6 +13461,9 @@
           </a:p>
           <a:p>
             <a:pPr marL="285750" indent="-285750">
+              <a:lnSpc>
+                <a:spcPct val="100000"/>
+              </a:lnSpc>
               <a:buFont typeface="Arial" panose="020B0604020202020204" pitchFamily="34" charset="0"/>
               <a:buChar char="•"/>
             </a:pPr>
@@ -14915,7 +13529,7 @@
             <a:fld id="{CE58CB1E-F828-4F11-99E0-327109AF9DA4}" type="slidenum">
               <a:rPr lang="de-DE" smtClean="0"/>
               <a:pPr/>
-              <a:t>18</a:t>
+              <a:t>16</a:t>
             </a:fld>
             <a:endParaRPr lang="de-DE" dirty="0"/>
           </a:p>
@@ -14923,10 +13537,10 @@
       </p:sp>
       <p:sp>
         <p:nvSpPr>
-          <p:cNvPr id="5" name="Footer Placeholder 4">
+          <p:cNvPr id="7" name="Fußzeilenplatzhalter 4">
             <a:extLst>
               <a:ext uri="{FF2B5EF4-FFF2-40B4-BE49-F238E27FC236}">
-                <a16:creationId xmlns:a16="http://schemas.microsoft.com/office/drawing/2014/main" id="{C1560D31-FCAC-4063-9501-BA815628F7B1}"/>
+                <a16:creationId xmlns:a16="http://schemas.microsoft.com/office/drawing/2014/main" id="{E88773E4-5FCB-44DE-AE9D-99AC6B5DFA04}"/>
               </a:ext>
             </a:extLst>
           </p:cNvPr>
@@ -14937,16 +13551,36 @@
             <p:ph type="ftr" sz="quarter" idx="12"/>
           </p:nvPr>
         </p:nvSpPr>
-        <p:spPr/>
+        <p:spPr>
+          <a:xfrm>
+            <a:off x="311162" y="4854985"/>
+            <a:ext cx="6464280" cy="273844"/>
+          </a:xfrm>
+        </p:spPr>
         <p:txBody>
           <a:bodyPr/>
           <a:lstStyle/>
           <a:p>
             <a:r>
-              <a:rPr lang="de-DE"/>
-              <a:t>Dr. rer. nat. Erika Mustermann (TUM) | kann beliebig erweitert werden | Infos mit Strich trennen</a:t>
-            </a:r>
-            <a:endParaRPr lang="en-US" dirty="0"/>
+              <a:rPr lang="de-DE" sz="1000" dirty="0"/>
+              <a:t>Von </a:t>
+            </a:r>
+            <a:r>
+              <a:rPr lang="de-DE" sz="1000" dirty="0" err="1"/>
+              <a:t>Aleksandre</a:t>
+            </a:r>
+            <a:r>
+              <a:rPr lang="de-DE" sz="1000" dirty="0"/>
+              <a:t> </a:t>
+            </a:r>
+            <a:r>
+              <a:rPr lang="de-DE" sz="1000" dirty="0" err="1"/>
+              <a:t>Kandelaki</a:t>
+            </a:r>
+            <a:r>
+              <a:rPr lang="de-DE" sz="1000" dirty="0"/>
+              <a:t>, Matthias Staritz und Benjamin Liertz</a:t>
+            </a:r>
           </a:p>
         </p:txBody>
       </p:sp>
@@ -14963,7 +13597,7 @@
 </p:sld>
 </file>
 
-<file path=ppt/slides/slide19.xml><?xml version="1.0" encoding="utf-8"?>
+<file path=ppt/slides/slide17.xml><?xml version="1.0" encoding="utf-8"?>
 <p:sld xmlns:a="http://schemas.openxmlformats.org/drawingml/2006/main" xmlns:r="http://schemas.openxmlformats.org/officeDocument/2006/relationships" xmlns:p="http://schemas.openxmlformats.org/presentationml/2006/main">
   <p:cSld>
     <p:spTree>
@@ -15047,7 +13681,7 @@
             <a:fld id="{CE58CB1E-F828-4F11-99E0-327109AF9DA4}" type="slidenum">
               <a:rPr lang="de-DE" smtClean="0"/>
               <a:pPr/>
-              <a:t>19</a:t>
+              <a:t>17</a:t>
             </a:fld>
             <a:endParaRPr lang="de-DE" dirty="0"/>
           </a:p>
@@ -15055,10 +13689,10 @@
       </p:sp>
       <p:sp>
         <p:nvSpPr>
-          <p:cNvPr id="5" name="Footer Placeholder 4">
+          <p:cNvPr id="7" name="Fußzeilenplatzhalter 4">
             <a:extLst>
               <a:ext uri="{FF2B5EF4-FFF2-40B4-BE49-F238E27FC236}">
-                <a16:creationId xmlns:a16="http://schemas.microsoft.com/office/drawing/2014/main" id="{35A98462-6C0C-45A4-BA9D-97C826A7B4A9}"/>
+                <a16:creationId xmlns:a16="http://schemas.microsoft.com/office/drawing/2014/main" id="{9CEE3059-97C1-4758-B1F6-DB8CED295766}"/>
               </a:ext>
             </a:extLst>
           </p:cNvPr>
@@ -15069,16 +13703,36 @@
             <p:ph type="ftr" sz="quarter" idx="12"/>
           </p:nvPr>
         </p:nvSpPr>
-        <p:spPr/>
+        <p:spPr>
+          <a:xfrm>
+            <a:off x="311162" y="4854985"/>
+            <a:ext cx="6464280" cy="273844"/>
+          </a:xfrm>
+        </p:spPr>
         <p:txBody>
           <a:bodyPr/>
           <a:lstStyle/>
           <a:p>
             <a:r>
-              <a:rPr lang="de-DE"/>
-              <a:t>Dr. rer. nat. Erika Mustermann (TUM) | kann beliebig erweitert werden | Infos mit Strich trennen</a:t>
-            </a:r>
-            <a:endParaRPr lang="en-US" dirty="0"/>
+              <a:rPr lang="de-DE" sz="1000" dirty="0"/>
+              <a:t>Von </a:t>
+            </a:r>
+            <a:r>
+              <a:rPr lang="de-DE" sz="1000" dirty="0" err="1"/>
+              <a:t>Aleksandre</a:t>
+            </a:r>
+            <a:r>
+              <a:rPr lang="de-DE" sz="1000" dirty="0"/>
+              <a:t> </a:t>
+            </a:r>
+            <a:r>
+              <a:rPr lang="de-DE" sz="1000" dirty="0" err="1"/>
+              <a:t>Kandelaki</a:t>
+            </a:r>
+            <a:r>
+              <a:rPr lang="de-DE" sz="1000" dirty="0"/>
+              <a:t>, Matthias Staritz und Benjamin Liertz</a:t>
+            </a:r>
           </a:p>
         </p:txBody>
       </p:sp>
@@ -18824,628 +17478,6 @@
           <a:chExt cx="0" cy="0"/>
         </a:xfrm>
       </p:grpSpPr>
-      <mc:AlternateContent xmlns:mc="http://schemas.openxmlformats.org/markup-compatibility/2006" xmlns:a14="http://schemas.microsoft.com/office/drawing/2010/main">
-        <mc:Choice Requires="a14">
-          <p:sp>
-            <p:nvSpPr>
-              <p:cNvPr id="2" name="Inhaltsplatzhalter 1"/>
-              <p:cNvSpPr>
-                <a:spLocks noGrp="1"/>
-              </p:cNvSpPr>
-              <p:nvPr>
-                <p:ph idx="1"/>
-              </p:nvPr>
-            </p:nvSpPr>
-            <p:spPr>
-              <a:xfrm>
-                <a:off x="531592" y="1625957"/>
-                <a:ext cx="8508999" cy="3095625"/>
-              </a:xfrm>
-            </p:spPr>
-            <p:txBody>
-              <a:bodyPr/>
-              <a:lstStyle/>
-              <a:p>
-                <a:pPr marL="0" lvl="1" indent="0">
-                  <a:buNone/>
-                </a:pPr>
-                <a:endParaRPr lang="de-DE" dirty="0"/>
-              </a:p>
-              <a:p>
-                <a:pPr lvl="1"/>
-                <a:endParaRPr lang="de-DE" dirty="0"/>
-              </a:p>
-              <a:p>
-                <a:pPr lvl="1"/>
-                <a:r>
-                  <a:rPr lang="de-DE" dirty="0"/>
-                  <a:t>Wahl zwischen Stack und Heap</a:t>
-                </a:r>
-              </a:p>
-              <a:p>
-                <a:pPr lvl="1"/>
-                <a:r>
-                  <a:rPr lang="de-DE" dirty="0"/>
-                  <a:t>Stack performanter aber begrenzt auf 8MB</a:t>
-                </a:r>
-              </a:p>
-              <a:p>
-                <a:pPr lvl="1"/>
-                <a:r>
-                  <a:rPr lang="de-DE" dirty="0"/>
-                  <a:t>Fallunterscheidung je nach größe der Eingabe</a:t>
-                </a:r>
-              </a:p>
-              <a:p>
-                <a:pPr lvl="1"/>
-                <a:r>
-                  <a:rPr lang="de-DE" dirty="0"/>
-                  <a:t>Berechnung der Maximalgröße für Stack Allokationen mit </a:t>
-                </a:r>
-                <a14:m>
-                  <m:oMath xmlns:m="http://schemas.openxmlformats.org/officeDocument/2006/math">
-                    <m:r>
-                      <a:rPr lang="en-GB" b="0" i="1" smtClean="0">
-                        <a:latin typeface="Cambria Math" panose="02040503050406030204" pitchFamily="18" charset="0"/>
-                      </a:rPr>
-                      <m:t>4</m:t>
-                    </m:r>
-                    <m:r>
-                      <a:rPr lang="en-GB" b="0" i="1" smtClean="0">
-                        <a:latin typeface="Cambria Math" panose="02040503050406030204" pitchFamily="18" charset="0"/>
-                        <a:ea typeface="Cambria Math" panose="02040503050406030204" pitchFamily="18" charset="0"/>
-                      </a:rPr>
-                      <m:t>×4</m:t>
-                    </m:r>
-                    <m:r>
-                      <a:rPr lang="en-GB" i="1">
-                        <a:latin typeface="Cambria Math" panose="02040503050406030204" pitchFamily="18" charset="0"/>
-                        <a:ea typeface="Cambria Math" panose="02040503050406030204" pitchFamily="18" charset="0"/>
-                      </a:rPr>
-                      <m:t>×</m:t>
-                    </m:r>
-                    <m:r>
-                      <a:rPr lang="en-GB" b="0" i="1" smtClean="0">
-                        <a:latin typeface="Cambria Math" panose="02040503050406030204" pitchFamily="18" charset="0"/>
-                        <a:ea typeface="Cambria Math" panose="02040503050406030204" pitchFamily="18" charset="0"/>
-                      </a:rPr>
-                      <m:t>𝑛</m:t>
-                    </m:r>
-                    <m:r>
-                      <a:rPr lang="en-GB" i="1">
-                        <a:latin typeface="Cambria Math" panose="02040503050406030204" pitchFamily="18" charset="0"/>
-                        <a:ea typeface="Cambria Math" panose="02040503050406030204" pitchFamily="18" charset="0"/>
-                      </a:rPr>
-                      <m:t>×</m:t>
-                    </m:r>
-                    <m:r>
-                      <a:rPr lang="en-GB" b="0" i="1" smtClean="0">
-                        <a:latin typeface="Cambria Math" panose="02040503050406030204" pitchFamily="18" charset="0"/>
-                        <a:ea typeface="Cambria Math" panose="02040503050406030204" pitchFamily="18" charset="0"/>
-                      </a:rPr>
-                      <m:t>𝑛</m:t>
-                    </m:r>
-                    <m:r>
-                      <a:rPr lang="en-GB" b="0" i="1" smtClean="0">
-                        <a:latin typeface="Cambria Math" panose="02040503050406030204" pitchFamily="18" charset="0"/>
-                        <a:ea typeface="Cambria Math" panose="02040503050406030204" pitchFamily="18" charset="0"/>
-                      </a:rPr>
-                      <m:t>≤8×</m:t>
-                    </m:r>
-                    <m:sSup>
-                      <m:sSupPr>
-                        <m:ctrlPr>
-                          <a:rPr lang="en-GB" b="0" i="1" smtClean="0">
-                            <a:latin typeface="Cambria Math" panose="02040503050406030204" pitchFamily="18" charset="0"/>
-                            <a:ea typeface="Cambria Math" panose="02040503050406030204" pitchFamily="18" charset="0"/>
-                          </a:rPr>
-                        </m:ctrlPr>
-                      </m:sSupPr>
-                      <m:e>
-                        <m:r>
-                          <a:rPr lang="en-GB" b="0" i="1" smtClean="0">
-                            <a:latin typeface="Cambria Math" panose="02040503050406030204" pitchFamily="18" charset="0"/>
-                            <a:ea typeface="Cambria Math" panose="02040503050406030204" pitchFamily="18" charset="0"/>
-                          </a:rPr>
-                          <m:t>10</m:t>
-                        </m:r>
-                      </m:e>
-                      <m:sup>
-                        <m:r>
-                          <a:rPr lang="en-GB" b="0" i="1" smtClean="0">
-                            <a:latin typeface="Cambria Math" panose="02040503050406030204" pitchFamily="18" charset="0"/>
-                            <a:ea typeface="Cambria Math" panose="02040503050406030204" pitchFamily="18" charset="0"/>
-                          </a:rPr>
-                          <m:t>6</m:t>
-                        </m:r>
-                      </m:sup>
-                    </m:sSup>
-                  </m:oMath>
-                </a14:m>
-                <a:endParaRPr lang="en-GB" b="0" dirty="0">
-                  <a:ea typeface="Cambria Math" panose="02040503050406030204" pitchFamily="18" charset="0"/>
-                </a:endParaRPr>
-              </a:p>
-              <a:p>
-                <a:pPr lvl="1"/>
-                <a:r>
-                  <a:rPr lang="de-DE" dirty="0"/>
-                  <a:t>Wenn </a:t>
-                </a:r>
-                <a14:m>
-                  <m:oMath xmlns:m="http://schemas.openxmlformats.org/officeDocument/2006/math">
-                    <m:r>
-                      <a:rPr lang="en-GB" b="0" i="1" smtClean="0">
-                        <a:latin typeface="Cambria Math" panose="02040503050406030204" pitchFamily="18" charset="0"/>
-                      </a:rPr>
-                      <m:t>𝑛</m:t>
-                    </m:r>
-                    <m:r>
-                      <a:rPr lang="en-GB" b="0" i="1" smtClean="0">
-                        <a:latin typeface="Cambria Math" panose="02040503050406030204" pitchFamily="18" charset="0"/>
-                      </a:rPr>
-                      <m:t> ≥700</m:t>
-                    </m:r>
-                  </m:oMath>
-                </a14:m>
-                <a:r>
-                  <a:rPr lang="de-DE" dirty="0"/>
-                  <a:t> Allokation auf dem Heap</a:t>
-                </a:r>
-              </a:p>
-              <a:p>
-                <a:pPr marL="0" lvl="1" indent="0">
-                  <a:buNone/>
-                </a:pPr>
-                <a:endParaRPr lang="de-DE" dirty="0"/>
-              </a:p>
-              <a:p>
-                <a:pPr lvl="1">
-                  <a:buNone/>
-                </a:pPr>
-                <a:endParaRPr lang="de-DE" dirty="0"/>
-              </a:p>
-            </p:txBody>
-          </p:sp>
-        </mc:Choice>
-        <mc:Fallback xmlns="">
-          <p:sp>
-            <p:nvSpPr>
-              <p:cNvPr id="2" name="Inhaltsplatzhalter 1"/>
-              <p:cNvSpPr>
-                <a:spLocks noGrp="1" noRot="1" noChangeAspect="1" noMove="1" noResize="1" noEditPoints="1" noAdjustHandles="1" noChangeArrowheads="1" noChangeShapeType="1" noTextEdit="1"/>
-              </p:cNvSpPr>
-              <p:nvPr>
-                <p:ph idx="1"/>
-              </p:nvPr>
-            </p:nvSpPr>
-            <p:spPr>
-              <a:xfrm>
-                <a:off x="531592" y="1625957"/>
-                <a:ext cx="8508999" cy="3095625"/>
-              </a:xfrm>
-              <a:blipFill>
-                <a:blip r:embed="rId3"/>
-                <a:stretch>
-                  <a:fillRect l="-1146"/>
-                </a:stretch>
-              </a:blipFill>
-            </p:spPr>
-            <p:txBody>
-              <a:bodyPr/>
-              <a:lstStyle/>
-              <a:p>
-                <a:r>
-                  <a:rPr lang="en-US">
-                    <a:noFill/>
-                  </a:rPr>
-                  <a:t> </a:t>
-                </a:r>
-              </a:p>
-            </p:txBody>
-          </p:sp>
-        </mc:Fallback>
-      </mc:AlternateContent>
-      <p:sp>
-        <p:nvSpPr>
-          <p:cNvPr id="3" name="Titel 2"/>
-          <p:cNvSpPr>
-            <a:spLocks noGrp="1"/>
-          </p:cNvSpPr>
-          <p:nvPr>
-            <p:ph type="title"/>
-          </p:nvPr>
-        </p:nvSpPr>
-        <p:spPr>
-          <a:xfrm>
-            <a:off x="319090" y="888288"/>
-            <a:ext cx="8508999" cy="380810"/>
-          </a:xfrm>
-        </p:spPr>
-        <p:txBody>
-          <a:bodyPr/>
-          <a:lstStyle/>
-          <a:p>
-            <a:r>
-              <a:rPr lang="de-DE" dirty="0"/>
-              <a:t>Speicherallokation</a:t>
-            </a:r>
-          </a:p>
-        </p:txBody>
-      </p:sp>
-      <p:sp>
-        <p:nvSpPr>
-          <p:cNvPr id="4" name="Foliennummernplatzhalter 3"/>
-          <p:cNvSpPr>
-            <a:spLocks noGrp="1"/>
-          </p:cNvSpPr>
-          <p:nvPr>
-            <p:ph type="sldNum" sz="quarter" idx="11"/>
-          </p:nvPr>
-        </p:nvSpPr>
-        <p:spPr/>
-        <p:txBody>
-          <a:bodyPr/>
-          <a:lstStyle/>
-          <a:p>
-            <a:fld id="{CE58CB1E-F828-4F11-99E0-327109AF9DA4}" type="slidenum">
-              <a:rPr lang="de-DE" smtClean="0"/>
-              <a:pPr/>
-              <a:t>8</a:t>
-            </a:fld>
-            <a:endParaRPr lang="de-DE" dirty="0"/>
-          </a:p>
-        </p:txBody>
-      </p:sp>
-      <p:sp>
-        <p:nvSpPr>
-          <p:cNvPr id="6" name="Fußzeilenplatzhalter 4">
-            <a:extLst>
-              <a:ext uri="{FF2B5EF4-FFF2-40B4-BE49-F238E27FC236}">
-                <a16:creationId xmlns:a16="http://schemas.microsoft.com/office/drawing/2014/main" id="{2B94328E-641C-4BA8-A3FE-648A218F9B63}"/>
-              </a:ext>
-            </a:extLst>
-          </p:cNvPr>
-          <p:cNvSpPr>
-            <a:spLocks noGrp="1"/>
-          </p:cNvSpPr>
-          <p:nvPr>
-            <p:ph type="ftr" sz="quarter" idx="12"/>
-          </p:nvPr>
-        </p:nvSpPr>
-        <p:spPr>
-          <a:xfrm>
-            <a:off x="311162" y="4854985"/>
-            <a:ext cx="6464280" cy="273844"/>
-          </a:xfrm>
-        </p:spPr>
-        <p:txBody>
-          <a:bodyPr/>
-          <a:lstStyle/>
-          <a:p>
-            <a:r>
-              <a:rPr lang="de-DE" sz="1000" dirty="0"/>
-              <a:t>Von </a:t>
-            </a:r>
-            <a:r>
-              <a:rPr lang="de-DE" sz="1000" dirty="0" err="1"/>
-              <a:t>Aleksandre</a:t>
-            </a:r>
-            <a:r>
-              <a:rPr lang="de-DE" sz="1000" dirty="0"/>
-              <a:t> </a:t>
-            </a:r>
-            <a:r>
-              <a:rPr lang="de-DE" sz="1000" dirty="0" err="1"/>
-              <a:t>Kandelaki</a:t>
-            </a:r>
-            <a:r>
-              <a:rPr lang="de-DE" sz="1000" dirty="0"/>
-              <a:t>, Matthias Staritz und Benjamin Liertz</a:t>
-            </a:r>
-          </a:p>
-        </p:txBody>
-      </p:sp>
-    </p:spTree>
-  </p:cSld>
-  <p:clrMapOvr>
-    <a:masterClrMapping/>
-  </p:clrMapOvr>
-  <p:timing>
-    <p:tnLst>
-      <p:par>
-        <p:cTn id="1" dur="indefinite" restart="never" nodeType="tmRoot">
-          <p:childTnLst>
-            <p:seq concurrent="1" nextAc="seek">
-              <p:cTn id="2" dur="indefinite" nodeType="mainSeq">
-                <p:childTnLst>
-                  <p:par>
-                    <p:cTn id="3" fill="hold">
-                      <p:stCondLst>
-                        <p:cond delay="indefinite"/>
-                      </p:stCondLst>
-                      <p:childTnLst>
-                        <p:par>
-                          <p:cTn id="4" fill="hold">
-                            <p:stCondLst>
-                              <p:cond delay="0"/>
-                            </p:stCondLst>
-                            <p:childTnLst>
-                              <p:par>
-                                <p:cTn id="5" presetID="1" presetClass="entr" presetSubtype="0" fill="hold" nodeType="clickEffect">
-                                  <p:stCondLst>
-                                    <p:cond delay="0"/>
-                                  </p:stCondLst>
-                                  <p:childTnLst>
-                                    <p:set>
-                                      <p:cBhvr>
-                                        <p:cTn id="6" dur="1" fill="hold">
-                                          <p:stCondLst>
-                                            <p:cond delay="0"/>
-                                          </p:stCondLst>
-                                        </p:cTn>
-                                        <p:tgtEl>
-                                          <p:spTgt spid="2">
-                                            <p:txEl>
-                                              <p:pRg st="2" end="2"/>
-                                            </p:txEl>
-                                          </p:spTgt>
-                                        </p:tgtEl>
-                                        <p:attrNameLst>
-                                          <p:attrName>style.visibility</p:attrName>
-                                        </p:attrNameLst>
-                                      </p:cBhvr>
-                                      <p:to>
-                                        <p:strVal val="visible"/>
-                                      </p:to>
-                                    </p:set>
-                                  </p:childTnLst>
-                                </p:cTn>
-                              </p:par>
-                            </p:childTnLst>
-                          </p:cTn>
-                        </p:par>
-                      </p:childTnLst>
-                    </p:cTn>
-                  </p:par>
-                  <p:par>
-                    <p:cTn id="7" fill="hold">
-                      <p:stCondLst>
-                        <p:cond delay="indefinite"/>
-                      </p:stCondLst>
-                      <p:childTnLst>
-                        <p:par>
-                          <p:cTn id="8" fill="hold">
-                            <p:stCondLst>
-                              <p:cond delay="0"/>
-                            </p:stCondLst>
-                            <p:childTnLst>
-                              <p:par>
-                                <p:cTn id="9" presetID="1" presetClass="entr" presetSubtype="0" fill="hold" nodeType="clickEffect">
-                                  <p:stCondLst>
-                                    <p:cond delay="0"/>
-                                  </p:stCondLst>
-                                  <p:childTnLst>
-                                    <p:set>
-                                      <p:cBhvr>
-                                        <p:cTn id="10" dur="1" fill="hold">
-                                          <p:stCondLst>
-                                            <p:cond delay="0"/>
-                                          </p:stCondLst>
-                                        </p:cTn>
-                                        <p:tgtEl>
-                                          <p:spTgt spid="2">
-                                            <p:txEl>
-                                              <p:pRg st="3" end="3"/>
-                                            </p:txEl>
-                                          </p:spTgt>
-                                        </p:tgtEl>
-                                        <p:attrNameLst>
-                                          <p:attrName>style.visibility</p:attrName>
-                                        </p:attrNameLst>
-                                      </p:cBhvr>
-                                      <p:to>
-                                        <p:strVal val="visible"/>
-                                      </p:to>
-                                    </p:set>
-                                  </p:childTnLst>
-                                </p:cTn>
-                              </p:par>
-                            </p:childTnLst>
-                          </p:cTn>
-                        </p:par>
-                      </p:childTnLst>
-                    </p:cTn>
-                  </p:par>
-                  <p:par>
-                    <p:cTn id="11" fill="hold">
-                      <p:stCondLst>
-                        <p:cond delay="indefinite"/>
-                      </p:stCondLst>
-                      <p:childTnLst>
-                        <p:par>
-                          <p:cTn id="12" fill="hold">
-                            <p:stCondLst>
-                              <p:cond delay="0"/>
-                            </p:stCondLst>
-                            <p:childTnLst>
-                              <p:par>
-                                <p:cTn id="13" presetID="1" presetClass="entr" presetSubtype="0" fill="hold" nodeType="clickEffect">
-                                  <p:stCondLst>
-                                    <p:cond delay="0"/>
-                                  </p:stCondLst>
-                                  <p:childTnLst>
-                                    <p:set>
-                                      <p:cBhvr>
-                                        <p:cTn id="14" dur="1" fill="hold">
-                                          <p:stCondLst>
-                                            <p:cond delay="0"/>
-                                          </p:stCondLst>
-                                        </p:cTn>
-                                        <p:tgtEl>
-                                          <p:spTgt spid="2">
-                                            <p:txEl>
-                                              <p:pRg st="4" end="4"/>
-                                            </p:txEl>
-                                          </p:spTgt>
-                                        </p:tgtEl>
-                                        <p:attrNameLst>
-                                          <p:attrName>style.visibility</p:attrName>
-                                        </p:attrNameLst>
-                                      </p:cBhvr>
-                                      <p:to>
-                                        <p:strVal val="visible"/>
-                                      </p:to>
-                                    </p:set>
-                                  </p:childTnLst>
-                                </p:cTn>
-                              </p:par>
-                            </p:childTnLst>
-                          </p:cTn>
-                        </p:par>
-                      </p:childTnLst>
-                    </p:cTn>
-                  </p:par>
-                  <p:par>
-                    <p:cTn id="15" fill="hold">
-                      <p:stCondLst>
-                        <p:cond delay="indefinite"/>
-                      </p:stCondLst>
-                      <p:childTnLst>
-                        <p:par>
-                          <p:cTn id="16" fill="hold">
-                            <p:stCondLst>
-                              <p:cond delay="0"/>
-                            </p:stCondLst>
-                            <p:childTnLst>
-                              <p:par>
-                                <p:cTn id="17" presetID="1" presetClass="entr" presetSubtype="0" fill="hold" nodeType="clickEffect">
-                                  <p:stCondLst>
-                                    <p:cond delay="0"/>
-                                  </p:stCondLst>
-                                  <p:childTnLst>
-                                    <p:set>
-                                      <p:cBhvr>
-                                        <p:cTn id="18" dur="1" fill="hold">
-                                          <p:stCondLst>
-                                            <p:cond delay="0"/>
-                                          </p:stCondLst>
-                                        </p:cTn>
-                                        <p:tgtEl>
-                                          <p:spTgt spid="2">
-                                            <p:txEl>
-                                              <p:pRg st="5" end="5"/>
-                                            </p:txEl>
-                                          </p:spTgt>
-                                        </p:tgtEl>
-                                        <p:attrNameLst>
-                                          <p:attrName>style.visibility</p:attrName>
-                                        </p:attrNameLst>
-                                      </p:cBhvr>
-                                      <p:to>
-                                        <p:strVal val="visible"/>
-                                      </p:to>
-                                    </p:set>
-                                  </p:childTnLst>
-                                </p:cTn>
-                              </p:par>
-                            </p:childTnLst>
-                          </p:cTn>
-                        </p:par>
-                      </p:childTnLst>
-                    </p:cTn>
-                  </p:par>
-                  <p:par>
-                    <p:cTn id="19" fill="hold">
-                      <p:stCondLst>
-                        <p:cond delay="indefinite"/>
-                      </p:stCondLst>
-                      <p:childTnLst>
-                        <p:par>
-                          <p:cTn id="20" fill="hold">
-                            <p:stCondLst>
-                              <p:cond delay="0"/>
-                            </p:stCondLst>
-                            <p:childTnLst>
-                              <p:par>
-                                <p:cTn id="21" presetID="1" presetClass="entr" presetSubtype="0" fill="hold" nodeType="clickEffect">
-                                  <p:stCondLst>
-                                    <p:cond delay="0"/>
-                                  </p:stCondLst>
-                                  <p:childTnLst>
-                                    <p:set>
-                                      <p:cBhvr>
-                                        <p:cTn id="22" dur="1" fill="hold">
-                                          <p:stCondLst>
-                                            <p:cond delay="0"/>
-                                          </p:stCondLst>
-                                        </p:cTn>
-                                        <p:tgtEl>
-                                          <p:spTgt spid="2">
-                                            <p:txEl>
-                                              <p:pRg st="6" end="6"/>
-                                            </p:txEl>
-                                          </p:spTgt>
-                                        </p:tgtEl>
-                                        <p:attrNameLst>
-                                          <p:attrName>style.visibility</p:attrName>
-                                        </p:attrNameLst>
-                                      </p:cBhvr>
-                                      <p:to>
-                                        <p:strVal val="visible"/>
-                                      </p:to>
-                                    </p:set>
-                                  </p:childTnLst>
-                                </p:cTn>
-                              </p:par>
-                            </p:childTnLst>
-                          </p:cTn>
-                        </p:par>
-                      </p:childTnLst>
-                    </p:cTn>
-                  </p:par>
-                </p:childTnLst>
-              </p:cTn>
-              <p:prevCondLst>
-                <p:cond evt="onPrev" delay="0">
-                  <p:tgtEl>
-                    <p:sldTgt/>
-                  </p:tgtEl>
-                </p:cond>
-              </p:prevCondLst>
-              <p:nextCondLst>
-                <p:cond evt="onNext" delay="0">
-                  <p:tgtEl>
-                    <p:sldTgt/>
-                  </p:tgtEl>
-                </p:cond>
-              </p:nextCondLst>
-            </p:seq>
-          </p:childTnLst>
-        </p:cTn>
-      </p:par>
-    </p:tnLst>
-  </p:timing>
-</p:sld>
-</file>
-
-<file path=ppt/slides/slide9.xml><?xml version="1.0" encoding="utf-8"?>
-<p:sld xmlns:a="http://schemas.openxmlformats.org/drawingml/2006/main" xmlns:r="http://schemas.openxmlformats.org/officeDocument/2006/relationships" xmlns:p="http://schemas.openxmlformats.org/presentationml/2006/main">
-  <p:cSld>
-    <p:spTree>
-      <p:nvGrpSpPr>
-        <p:cNvPr id="1" name=""/>
-        <p:cNvGrpSpPr/>
-        <p:nvPr/>
-      </p:nvGrpSpPr>
-      <p:grpSpPr>
-        <a:xfrm>
-          <a:off x="0" y="0"/>
-          <a:ext cx="0" cy="0"/>
-          <a:chOff x="0" y="0"/>
-          <a:chExt cx="0" cy="0"/>
-        </a:xfrm>
-      </p:grpSpPr>
       <p:sp>
         <p:nvSpPr>
           <p:cNvPr id="2" name="Inhaltsplatzhalter 1"/>
@@ -19518,7 +17550,7 @@
             <a:fld id="{CE58CB1E-F828-4F11-99E0-327109AF9DA4}" type="slidenum">
               <a:rPr lang="de-DE" smtClean="0"/>
               <a:pPr/>
-              <a:t>9</a:t>
+              <a:t>8</a:t>
             </a:fld>
             <a:endParaRPr lang="de-DE" dirty="0"/>
           </a:p>
@@ -20024,6 +18056,897 @@
     <p:extLst>
       <p:ext uri="{BB962C8B-B14F-4D97-AF65-F5344CB8AC3E}">
         <p14:creationId xmlns:p14="http://schemas.microsoft.com/office/powerpoint/2010/main" val="219997872"/>
+      </p:ext>
+    </p:extLst>
+  </p:cSld>
+  <p:clrMapOvr>
+    <a:masterClrMapping/>
+  </p:clrMapOvr>
+</p:sld>
+</file>
+
+<file path=ppt/slides/slide9.xml><?xml version="1.0" encoding="utf-8"?>
+<p:sld xmlns:a="http://schemas.openxmlformats.org/drawingml/2006/main" xmlns:r="http://schemas.openxmlformats.org/officeDocument/2006/relationships" xmlns:p="http://schemas.openxmlformats.org/presentationml/2006/main">
+  <p:cSld>
+    <p:spTree>
+      <p:nvGrpSpPr>
+        <p:cNvPr id="1" name=""/>
+        <p:cNvGrpSpPr/>
+        <p:nvPr/>
+      </p:nvGrpSpPr>
+      <p:grpSpPr>
+        <a:xfrm>
+          <a:off x="0" y="0"/>
+          <a:ext cx="0" cy="0"/>
+          <a:chOff x="0" y="0"/>
+          <a:chExt cx="0" cy="0"/>
+        </a:xfrm>
+      </p:grpSpPr>
+      <p:sp>
+        <p:nvSpPr>
+          <p:cNvPr id="2" name="Inhaltsplatzhalter 1"/>
+          <p:cNvSpPr>
+            <a:spLocks noGrp="1"/>
+          </p:cNvSpPr>
+          <p:nvPr>
+            <p:ph idx="1"/>
+          </p:nvPr>
+        </p:nvSpPr>
+        <p:spPr>
+          <a:xfrm>
+            <a:off x="490540" y="1615194"/>
+            <a:ext cx="2295522" cy="273845"/>
+          </a:xfrm>
+        </p:spPr>
+        <p:txBody>
+          <a:bodyPr/>
+          <a:lstStyle/>
+          <a:p>
+            <a:r>
+              <a:rPr lang="de-DE" dirty="0"/>
+              <a:t>Lineares Gleichungssystem:</a:t>
+            </a:r>
+          </a:p>
+        </p:txBody>
+      </p:sp>
+      <p:sp>
+        <p:nvSpPr>
+          <p:cNvPr id="3" name="Titel 2"/>
+          <p:cNvSpPr>
+            <a:spLocks noGrp="1"/>
+          </p:cNvSpPr>
+          <p:nvPr>
+            <p:ph type="title"/>
+          </p:nvPr>
+        </p:nvSpPr>
+        <p:spPr>
+          <a:xfrm>
+            <a:off x="318009" y="837520"/>
+            <a:ext cx="8508999" cy="380810"/>
+          </a:xfrm>
+        </p:spPr>
+        <p:txBody>
+          <a:bodyPr/>
+          <a:lstStyle/>
+          <a:p>
+            <a:r>
+              <a:rPr lang="de-DE" dirty="0"/>
+              <a:t>Kondition Beispiel</a:t>
+            </a:r>
+          </a:p>
+        </p:txBody>
+      </p:sp>
+      <p:sp>
+        <p:nvSpPr>
+          <p:cNvPr id="4" name="Foliennummernplatzhalter 3"/>
+          <p:cNvSpPr>
+            <a:spLocks noGrp="1"/>
+          </p:cNvSpPr>
+          <p:nvPr>
+            <p:ph type="sldNum" sz="quarter" idx="11"/>
+          </p:nvPr>
+        </p:nvSpPr>
+        <p:spPr/>
+        <p:txBody>
+          <a:bodyPr/>
+          <a:lstStyle/>
+          <a:p>
+            <a:fld id="{CE58CB1E-F828-4F11-99E0-327109AF9DA4}" type="slidenum">
+              <a:rPr lang="de-DE" smtClean="0"/>
+              <a:pPr/>
+              <a:t>9</a:t>
+            </a:fld>
+            <a:endParaRPr lang="de-DE" dirty="0"/>
+          </a:p>
+        </p:txBody>
+      </p:sp>
+      <p:sp>
+        <p:nvSpPr>
+          <p:cNvPr id="7" name="Fußzeilenplatzhalter 4"/>
+          <p:cNvSpPr>
+            <a:spLocks noGrp="1"/>
+          </p:cNvSpPr>
+          <p:nvPr>
+            <p:ph type="ftr" sz="quarter" idx="12"/>
+          </p:nvPr>
+        </p:nvSpPr>
+        <p:spPr/>
+        <p:txBody>
+          <a:bodyPr/>
+          <a:lstStyle/>
+          <a:p>
+            <a:r>
+              <a:rPr lang="de-DE" sz="1000" dirty="0"/>
+              <a:t>Von </a:t>
+            </a:r>
+            <a:r>
+              <a:rPr lang="de-DE" sz="1000" dirty="0" err="1"/>
+              <a:t>Aleksandre</a:t>
+            </a:r>
+            <a:r>
+              <a:rPr lang="de-DE" sz="1000" dirty="0"/>
+              <a:t> </a:t>
+            </a:r>
+            <a:r>
+              <a:rPr lang="de-DE" sz="1000" dirty="0" err="1"/>
+              <a:t>Kandelaki</a:t>
+            </a:r>
+            <a:r>
+              <a:rPr lang="de-DE" sz="1000" dirty="0"/>
+              <a:t>, Matthias Staritz und Benjamin Liertz</a:t>
+            </a:r>
+          </a:p>
+        </p:txBody>
+      </p:sp>
+      <p:sp>
+        <p:nvSpPr>
+          <p:cNvPr id="11" name="Inhaltsplatzhalter 1">
+            <a:extLst>
+              <a:ext uri="{FF2B5EF4-FFF2-40B4-BE49-F238E27FC236}">
+                <a16:creationId xmlns:a16="http://schemas.microsoft.com/office/drawing/2014/main" id="{50248EC9-836D-4B59-A3DC-0C01D29E621F}"/>
+              </a:ext>
+            </a:extLst>
+          </p:cNvPr>
+          <p:cNvSpPr txBox="1">
+            <a:spLocks/>
+          </p:cNvSpPr>
+          <p:nvPr/>
+        </p:nvSpPr>
+        <p:spPr>
+          <a:xfrm>
+            <a:off x="490540" y="3284101"/>
+            <a:ext cx="3164680" cy="273844"/>
+          </a:xfrm>
+          <a:prstGeom prst="rect">
+            <a:avLst/>
+          </a:prstGeom>
+          <a:noFill/>
+          <a:ln w="9525">
+            <a:noFill/>
+            <a:miter lim="800000"/>
+            <a:headEnd/>
+            <a:tailEnd/>
+          </a:ln>
+        </p:spPr>
+        <p:txBody>
+          <a:bodyPr vert="horz" wrap="square" lIns="0" tIns="0" rIns="0" bIns="0" numCol="1" anchor="t" anchorCtr="0" compatLnSpc="1">
+            <a:prstTxWarp prst="textNoShape">
+              <a:avLst/>
+            </a:prstTxWarp>
+          </a:bodyPr>
+          <a:lstStyle>
+            <a:lvl1pPr algn="l" rtl="0" eaLnBrk="0" fontAlgn="base" hangingPunct="0">
+              <a:lnSpc>
+                <a:spcPct val="114000"/>
+              </a:lnSpc>
+              <a:spcBef>
+                <a:spcPct val="0"/>
+              </a:spcBef>
+              <a:spcAft>
+                <a:spcPct val="0"/>
+              </a:spcAft>
+              <a:defRPr lang="de-DE" sz="1400" kern="1200" noProof="0" dirty="0" smtClean="0">
+                <a:solidFill>
+                  <a:schemeClr val="tx1"/>
+                </a:solidFill>
+                <a:latin typeface="+mn-lt"/>
+                <a:ea typeface="+mn-ea"/>
+                <a:cs typeface="+mn-cs"/>
+              </a:defRPr>
+            </a:lvl1pPr>
+            <a:lvl2pPr marL="176213" indent="-176213" algn="l" rtl="0" eaLnBrk="0" fontAlgn="base" hangingPunct="0">
+              <a:lnSpc>
+                <a:spcPct val="114000"/>
+              </a:lnSpc>
+              <a:spcBef>
+                <a:spcPct val="0"/>
+              </a:spcBef>
+              <a:spcAft>
+                <a:spcPct val="0"/>
+              </a:spcAft>
+              <a:buFont typeface="Arial" charset="0"/>
+              <a:buChar char="•"/>
+              <a:defRPr lang="de-DE" sz="1400" kern="1200" noProof="0" dirty="0" smtClean="0">
+                <a:solidFill>
+                  <a:schemeClr val="tx1"/>
+                </a:solidFill>
+                <a:latin typeface="+mn-lt"/>
+                <a:ea typeface="+mn-ea"/>
+                <a:cs typeface="+mn-cs"/>
+              </a:defRPr>
+            </a:lvl2pPr>
+            <a:lvl3pPr marL="360363" indent="-184150" algn="l" rtl="0" eaLnBrk="0" fontAlgn="base" hangingPunct="0">
+              <a:lnSpc>
+                <a:spcPct val="125000"/>
+              </a:lnSpc>
+              <a:spcBef>
+                <a:spcPct val="0"/>
+              </a:spcBef>
+              <a:spcAft>
+                <a:spcPct val="0"/>
+              </a:spcAft>
+              <a:buFont typeface="Symbol" pitchFamily="18" charset="2"/>
+              <a:buChar char="-"/>
+              <a:defRPr sz="1400" kern="1200">
+                <a:solidFill>
+                  <a:schemeClr val="tx1"/>
+                </a:solidFill>
+                <a:latin typeface="+mn-lt"/>
+                <a:ea typeface="+mn-ea"/>
+                <a:cs typeface="+mn-cs"/>
+              </a:defRPr>
+            </a:lvl3pPr>
+            <a:lvl4pPr marL="538163" indent="-177800" algn="l" rtl="0" eaLnBrk="0" fontAlgn="base" hangingPunct="0">
+              <a:lnSpc>
+                <a:spcPct val="125000"/>
+              </a:lnSpc>
+              <a:spcBef>
+                <a:spcPct val="0"/>
+              </a:spcBef>
+              <a:spcAft>
+                <a:spcPct val="0"/>
+              </a:spcAft>
+              <a:buFont typeface="Symbol" pitchFamily="18" charset="2"/>
+              <a:buChar char="-"/>
+              <a:defRPr sz="1400" kern="1200">
+                <a:solidFill>
+                  <a:schemeClr val="tx1"/>
+                </a:solidFill>
+                <a:latin typeface="+mn-lt"/>
+                <a:ea typeface="+mn-ea"/>
+                <a:cs typeface="+mn-cs"/>
+              </a:defRPr>
+            </a:lvl4pPr>
+            <a:lvl5pPr marL="714375" indent="-176213" algn="l" rtl="0" eaLnBrk="0" fontAlgn="base" hangingPunct="0">
+              <a:lnSpc>
+                <a:spcPct val="125000"/>
+              </a:lnSpc>
+              <a:spcBef>
+                <a:spcPct val="0"/>
+              </a:spcBef>
+              <a:spcAft>
+                <a:spcPct val="0"/>
+              </a:spcAft>
+              <a:buFont typeface="Symbol" pitchFamily="18" charset="2"/>
+              <a:buChar char="-"/>
+              <a:defRPr sz="1400" kern="1200">
+                <a:solidFill>
+                  <a:schemeClr val="tx1"/>
+                </a:solidFill>
+                <a:latin typeface="+mn-lt"/>
+                <a:ea typeface="+mn-ea"/>
+                <a:cs typeface="+mn-cs"/>
+              </a:defRPr>
+            </a:lvl5pPr>
+            <a:lvl6pPr marL="2514600" indent="-228600" algn="l" defTabSz="914400" rtl="0" eaLnBrk="1" latinLnBrk="0" hangingPunct="1">
+              <a:spcBef>
+                <a:spcPct val="20000"/>
+              </a:spcBef>
+              <a:buFont typeface="Arial" pitchFamily="34" charset="0"/>
+              <a:buChar char="•"/>
+              <a:defRPr sz="2000" kern="1200">
+                <a:solidFill>
+                  <a:schemeClr val="tx1"/>
+                </a:solidFill>
+                <a:latin typeface="+mn-lt"/>
+                <a:ea typeface="+mn-ea"/>
+                <a:cs typeface="+mn-cs"/>
+              </a:defRPr>
+            </a:lvl6pPr>
+            <a:lvl7pPr marL="2971800" indent="-228600" algn="l" defTabSz="914400" rtl="0" eaLnBrk="1" latinLnBrk="0" hangingPunct="1">
+              <a:spcBef>
+                <a:spcPct val="20000"/>
+              </a:spcBef>
+              <a:buFont typeface="Arial" pitchFamily="34" charset="0"/>
+              <a:buChar char="•"/>
+              <a:defRPr sz="2000" kern="1200">
+                <a:solidFill>
+                  <a:schemeClr val="tx1"/>
+                </a:solidFill>
+                <a:latin typeface="+mn-lt"/>
+                <a:ea typeface="+mn-ea"/>
+                <a:cs typeface="+mn-cs"/>
+              </a:defRPr>
+            </a:lvl7pPr>
+            <a:lvl8pPr marL="3429000" indent="-228600" algn="l" defTabSz="914400" rtl="0" eaLnBrk="1" latinLnBrk="0" hangingPunct="1">
+              <a:spcBef>
+                <a:spcPct val="20000"/>
+              </a:spcBef>
+              <a:buFont typeface="Arial" pitchFamily="34" charset="0"/>
+              <a:buChar char="•"/>
+              <a:defRPr sz="2000" kern="1200">
+                <a:solidFill>
+                  <a:schemeClr val="tx1"/>
+                </a:solidFill>
+                <a:latin typeface="+mn-lt"/>
+                <a:ea typeface="+mn-ea"/>
+                <a:cs typeface="+mn-cs"/>
+              </a:defRPr>
+            </a:lvl8pPr>
+            <a:lvl9pPr marL="3886200" indent="-228600" algn="l" defTabSz="914400" rtl="0" eaLnBrk="1" latinLnBrk="0" hangingPunct="1">
+              <a:spcBef>
+                <a:spcPct val="20000"/>
+              </a:spcBef>
+              <a:buFont typeface="Arial" pitchFamily="34" charset="0"/>
+              <a:buChar char="•"/>
+              <a:defRPr sz="2000" kern="1200">
+                <a:solidFill>
+                  <a:schemeClr val="tx1"/>
+                </a:solidFill>
+                <a:latin typeface="+mn-lt"/>
+                <a:ea typeface="+mn-ea"/>
+                <a:cs typeface="+mn-cs"/>
+              </a:defRPr>
+            </a:lvl9pPr>
+          </a:lstStyle>
+          <a:p>
+            <a:r>
+              <a:rPr lang="de-DE" dirty="0"/>
+              <a:t>Störung der rechten Seite mit  0 &lt; ϵ ≪ 1</a:t>
+            </a:r>
+          </a:p>
+        </p:txBody>
+      </p:sp>
+      <p:pic>
+        <p:nvPicPr>
+          <p:cNvPr id="6" name="Grafik 5">
+            <a:extLst>
+              <a:ext uri="{FF2B5EF4-FFF2-40B4-BE49-F238E27FC236}">
+                <a16:creationId xmlns:a16="http://schemas.microsoft.com/office/drawing/2014/main" id="{CDC64237-D7C6-4492-BEA6-46C3D055BBCF}"/>
+              </a:ext>
+            </a:extLst>
+          </p:cNvPr>
+          <p:cNvPicPr>
+            <a:picLocks noChangeAspect="1"/>
+          </p:cNvPicPr>
+          <p:nvPr/>
+        </p:nvPicPr>
+        <p:blipFill rotWithShape="1">
+          <a:blip r:embed="rId2"/>
+          <a:srcRect r="25447"/>
+          <a:stretch/>
+        </p:blipFill>
+        <p:spPr>
+          <a:xfrm>
+            <a:off x="614363" y="2088430"/>
+            <a:ext cx="3087687" cy="637456"/>
+          </a:xfrm>
+          <a:prstGeom prst="rect">
+            <a:avLst/>
+          </a:prstGeom>
+        </p:spPr>
+      </p:pic>
+      <p:pic>
+        <p:nvPicPr>
+          <p:cNvPr id="10" name="Grafik 9">
+            <a:extLst>
+              <a:ext uri="{FF2B5EF4-FFF2-40B4-BE49-F238E27FC236}">
+                <a16:creationId xmlns:a16="http://schemas.microsoft.com/office/drawing/2014/main" id="{7D572F9B-51E6-439D-A258-20926070AB5C}"/>
+              </a:ext>
+            </a:extLst>
+          </p:cNvPr>
+          <p:cNvPicPr>
+            <a:picLocks noChangeAspect="1"/>
+          </p:cNvPicPr>
+          <p:nvPr/>
+        </p:nvPicPr>
+        <p:blipFill rotWithShape="1">
+          <a:blip r:embed="rId3"/>
+          <a:srcRect r="32675"/>
+          <a:stretch/>
+        </p:blipFill>
+        <p:spPr>
+          <a:xfrm>
+            <a:off x="614363" y="3691737"/>
+            <a:ext cx="2947987" cy="652801"/>
+          </a:xfrm>
+          <a:prstGeom prst="rect">
+            <a:avLst/>
+          </a:prstGeom>
+        </p:spPr>
+      </p:pic>
+      <p:sp>
+        <p:nvSpPr>
+          <p:cNvPr id="13" name="Inhaltsplatzhalter 1">
+            <a:extLst>
+              <a:ext uri="{FF2B5EF4-FFF2-40B4-BE49-F238E27FC236}">
+                <a16:creationId xmlns:a16="http://schemas.microsoft.com/office/drawing/2014/main" id="{0D73D764-9903-49C5-9D33-D8B354E1897D}"/>
+              </a:ext>
+            </a:extLst>
+          </p:cNvPr>
+          <p:cNvSpPr txBox="1">
+            <a:spLocks/>
+          </p:cNvSpPr>
+          <p:nvPr/>
+        </p:nvSpPr>
+        <p:spPr>
+          <a:xfrm>
+            <a:off x="4516440" y="2240684"/>
+            <a:ext cx="785810" cy="273845"/>
+          </a:xfrm>
+          <a:prstGeom prst="rect">
+            <a:avLst/>
+          </a:prstGeom>
+          <a:noFill/>
+          <a:ln w="9525">
+            <a:noFill/>
+            <a:miter lim="800000"/>
+            <a:headEnd/>
+            <a:tailEnd/>
+          </a:ln>
+        </p:spPr>
+        <p:txBody>
+          <a:bodyPr vert="horz" wrap="square" lIns="0" tIns="0" rIns="0" bIns="0" numCol="1" anchor="t" anchorCtr="0" compatLnSpc="1">
+            <a:prstTxWarp prst="textNoShape">
+              <a:avLst/>
+            </a:prstTxWarp>
+          </a:bodyPr>
+          <a:lstStyle>
+            <a:lvl1pPr algn="l" rtl="0" eaLnBrk="0" fontAlgn="base" hangingPunct="0">
+              <a:lnSpc>
+                <a:spcPct val="114000"/>
+              </a:lnSpc>
+              <a:spcBef>
+                <a:spcPct val="0"/>
+              </a:spcBef>
+              <a:spcAft>
+                <a:spcPct val="0"/>
+              </a:spcAft>
+              <a:defRPr lang="de-DE" sz="1400" kern="1200" noProof="0" dirty="0" smtClean="0">
+                <a:solidFill>
+                  <a:schemeClr val="tx1"/>
+                </a:solidFill>
+                <a:latin typeface="+mn-lt"/>
+                <a:ea typeface="+mn-ea"/>
+                <a:cs typeface="+mn-cs"/>
+              </a:defRPr>
+            </a:lvl1pPr>
+            <a:lvl2pPr marL="176213" indent="-176213" algn="l" rtl="0" eaLnBrk="0" fontAlgn="base" hangingPunct="0">
+              <a:lnSpc>
+                <a:spcPct val="114000"/>
+              </a:lnSpc>
+              <a:spcBef>
+                <a:spcPct val="0"/>
+              </a:spcBef>
+              <a:spcAft>
+                <a:spcPct val="0"/>
+              </a:spcAft>
+              <a:buFont typeface="Arial" charset="0"/>
+              <a:buChar char="•"/>
+              <a:defRPr lang="de-DE" sz="1400" kern="1200" noProof="0" dirty="0" smtClean="0">
+                <a:solidFill>
+                  <a:schemeClr val="tx1"/>
+                </a:solidFill>
+                <a:latin typeface="+mn-lt"/>
+                <a:ea typeface="+mn-ea"/>
+                <a:cs typeface="+mn-cs"/>
+              </a:defRPr>
+            </a:lvl2pPr>
+            <a:lvl3pPr marL="360363" indent="-184150" algn="l" rtl="0" eaLnBrk="0" fontAlgn="base" hangingPunct="0">
+              <a:lnSpc>
+                <a:spcPct val="125000"/>
+              </a:lnSpc>
+              <a:spcBef>
+                <a:spcPct val="0"/>
+              </a:spcBef>
+              <a:spcAft>
+                <a:spcPct val="0"/>
+              </a:spcAft>
+              <a:buFont typeface="Symbol" pitchFamily="18" charset="2"/>
+              <a:buChar char="-"/>
+              <a:defRPr sz="1400" kern="1200">
+                <a:solidFill>
+                  <a:schemeClr val="tx1"/>
+                </a:solidFill>
+                <a:latin typeface="+mn-lt"/>
+                <a:ea typeface="+mn-ea"/>
+                <a:cs typeface="+mn-cs"/>
+              </a:defRPr>
+            </a:lvl3pPr>
+            <a:lvl4pPr marL="538163" indent="-177800" algn="l" rtl="0" eaLnBrk="0" fontAlgn="base" hangingPunct="0">
+              <a:lnSpc>
+                <a:spcPct val="125000"/>
+              </a:lnSpc>
+              <a:spcBef>
+                <a:spcPct val="0"/>
+              </a:spcBef>
+              <a:spcAft>
+                <a:spcPct val="0"/>
+              </a:spcAft>
+              <a:buFont typeface="Symbol" pitchFamily="18" charset="2"/>
+              <a:buChar char="-"/>
+              <a:defRPr sz="1400" kern="1200">
+                <a:solidFill>
+                  <a:schemeClr val="tx1"/>
+                </a:solidFill>
+                <a:latin typeface="+mn-lt"/>
+                <a:ea typeface="+mn-ea"/>
+                <a:cs typeface="+mn-cs"/>
+              </a:defRPr>
+            </a:lvl4pPr>
+            <a:lvl5pPr marL="714375" indent="-176213" algn="l" rtl="0" eaLnBrk="0" fontAlgn="base" hangingPunct="0">
+              <a:lnSpc>
+                <a:spcPct val="125000"/>
+              </a:lnSpc>
+              <a:spcBef>
+                <a:spcPct val="0"/>
+              </a:spcBef>
+              <a:spcAft>
+                <a:spcPct val="0"/>
+              </a:spcAft>
+              <a:buFont typeface="Symbol" pitchFamily="18" charset="2"/>
+              <a:buChar char="-"/>
+              <a:defRPr sz="1400" kern="1200">
+                <a:solidFill>
+                  <a:schemeClr val="tx1"/>
+                </a:solidFill>
+                <a:latin typeface="+mn-lt"/>
+                <a:ea typeface="+mn-ea"/>
+                <a:cs typeface="+mn-cs"/>
+              </a:defRPr>
+            </a:lvl5pPr>
+            <a:lvl6pPr marL="2514600" indent="-228600" algn="l" defTabSz="914400" rtl="0" eaLnBrk="1" latinLnBrk="0" hangingPunct="1">
+              <a:spcBef>
+                <a:spcPct val="20000"/>
+              </a:spcBef>
+              <a:buFont typeface="Arial" pitchFamily="34" charset="0"/>
+              <a:buChar char="•"/>
+              <a:defRPr sz="2000" kern="1200">
+                <a:solidFill>
+                  <a:schemeClr val="tx1"/>
+                </a:solidFill>
+                <a:latin typeface="+mn-lt"/>
+                <a:ea typeface="+mn-ea"/>
+                <a:cs typeface="+mn-cs"/>
+              </a:defRPr>
+            </a:lvl6pPr>
+            <a:lvl7pPr marL="2971800" indent="-228600" algn="l" defTabSz="914400" rtl="0" eaLnBrk="1" latinLnBrk="0" hangingPunct="1">
+              <a:spcBef>
+                <a:spcPct val="20000"/>
+              </a:spcBef>
+              <a:buFont typeface="Arial" pitchFamily="34" charset="0"/>
+              <a:buChar char="•"/>
+              <a:defRPr sz="2000" kern="1200">
+                <a:solidFill>
+                  <a:schemeClr val="tx1"/>
+                </a:solidFill>
+                <a:latin typeface="+mn-lt"/>
+                <a:ea typeface="+mn-ea"/>
+                <a:cs typeface="+mn-cs"/>
+              </a:defRPr>
+            </a:lvl7pPr>
+            <a:lvl8pPr marL="3429000" indent="-228600" algn="l" defTabSz="914400" rtl="0" eaLnBrk="1" latinLnBrk="0" hangingPunct="1">
+              <a:spcBef>
+                <a:spcPct val="20000"/>
+              </a:spcBef>
+              <a:buFont typeface="Arial" pitchFamily="34" charset="0"/>
+              <a:buChar char="•"/>
+              <a:defRPr sz="2000" kern="1200">
+                <a:solidFill>
+                  <a:schemeClr val="tx1"/>
+                </a:solidFill>
+                <a:latin typeface="+mn-lt"/>
+                <a:ea typeface="+mn-ea"/>
+                <a:cs typeface="+mn-cs"/>
+              </a:defRPr>
+            </a:lvl8pPr>
+            <a:lvl9pPr marL="3886200" indent="-228600" algn="l" defTabSz="914400" rtl="0" eaLnBrk="1" latinLnBrk="0" hangingPunct="1">
+              <a:spcBef>
+                <a:spcPct val="20000"/>
+              </a:spcBef>
+              <a:buFont typeface="Arial" pitchFamily="34" charset="0"/>
+              <a:buChar char="•"/>
+              <a:defRPr sz="2000" kern="1200">
+                <a:solidFill>
+                  <a:schemeClr val="tx1"/>
+                </a:solidFill>
+                <a:latin typeface="+mn-lt"/>
+                <a:ea typeface="+mn-ea"/>
+                <a:cs typeface="+mn-cs"/>
+              </a:defRPr>
+            </a:lvl9pPr>
+          </a:lstStyle>
+          <a:p>
+            <a:r>
+              <a:rPr lang="de-DE" dirty="0"/>
+              <a:t>Lösung:</a:t>
+            </a:r>
+          </a:p>
+        </p:txBody>
+      </p:sp>
+      <p:sp>
+        <p:nvSpPr>
+          <p:cNvPr id="14" name="Inhaltsplatzhalter 1">
+            <a:extLst>
+              <a:ext uri="{FF2B5EF4-FFF2-40B4-BE49-F238E27FC236}">
+                <a16:creationId xmlns:a16="http://schemas.microsoft.com/office/drawing/2014/main" id="{628C1E4A-54B0-4640-BDFE-862ECACBB9D0}"/>
+              </a:ext>
+            </a:extLst>
+          </p:cNvPr>
+          <p:cNvSpPr txBox="1">
+            <a:spLocks/>
+          </p:cNvSpPr>
+          <p:nvPr/>
+        </p:nvSpPr>
+        <p:spPr>
+          <a:xfrm>
+            <a:off x="4516440" y="3851663"/>
+            <a:ext cx="785810" cy="273845"/>
+          </a:xfrm>
+          <a:prstGeom prst="rect">
+            <a:avLst/>
+          </a:prstGeom>
+          <a:noFill/>
+          <a:ln w="9525">
+            <a:noFill/>
+            <a:miter lim="800000"/>
+            <a:headEnd/>
+            <a:tailEnd/>
+          </a:ln>
+        </p:spPr>
+        <p:txBody>
+          <a:bodyPr vert="horz" wrap="square" lIns="0" tIns="0" rIns="0" bIns="0" numCol="1" anchor="t" anchorCtr="0" compatLnSpc="1">
+            <a:prstTxWarp prst="textNoShape">
+              <a:avLst/>
+            </a:prstTxWarp>
+          </a:bodyPr>
+          <a:lstStyle>
+            <a:lvl1pPr algn="l" rtl="0" eaLnBrk="0" fontAlgn="base" hangingPunct="0">
+              <a:lnSpc>
+                <a:spcPct val="114000"/>
+              </a:lnSpc>
+              <a:spcBef>
+                <a:spcPct val="0"/>
+              </a:spcBef>
+              <a:spcAft>
+                <a:spcPct val="0"/>
+              </a:spcAft>
+              <a:defRPr lang="de-DE" sz="1400" kern="1200" noProof="0" dirty="0" smtClean="0">
+                <a:solidFill>
+                  <a:schemeClr val="tx1"/>
+                </a:solidFill>
+                <a:latin typeface="+mn-lt"/>
+                <a:ea typeface="+mn-ea"/>
+                <a:cs typeface="+mn-cs"/>
+              </a:defRPr>
+            </a:lvl1pPr>
+            <a:lvl2pPr marL="176213" indent="-176213" algn="l" rtl="0" eaLnBrk="0" fontAlgn="base" hangingPunct="0">
+              <a:lnSpc>
+                <a:spcPct val="114000"/>
+              </a:lnSpc>
+              <a:spcBef>
+                <a:spcPct val="0"/>
+              </a:spcBef>
+              <a:spcAft>
+                <a:spcPct val="0"/>
+              </a:spcAft>
+              <a:buFont typeface="Arial" charset="0"/>
+              <a:buChar char="•"/>
+              <a:defRPr lang="de-DE" sz="1400" kern="1200" noProof="0" dirty="0" smtClean="0">
+                <a:solidFill>
+                  <a:schemeClr val="tx1"/>
+                </a:solidFill>
+                <a:latin typeface="+mn-lt"/>
+                <a:ea typeface="+mn-ea"/>
+                <a:cs typeface="+mn-cs"/>
+              </a:defRPr>
+            </a:lvl2pPr>
+            <a:lvl3pPr marL="360363" indent="-184150" algn="l" rtl="0" eaLnBrk="0" fontAlgn="base" hangingPunct="0">
+              <a:lnSpc>
+                <a:spcPct val="125000"/>
+              </a:lnSpc>
+              <a:spcBef>
+                <a:spcPct val="0"/>
+              </a:spcBef>
+              <a:spcAft>
+                <a:spcPct val="0"/>
+              </a:spcAft>
+              <a:buFont typeface="Symbol" pitchFamily="18" charset="2"/>
+              <a:buChar char="-"/>
+              <a:defRPr sz="1400" kern="1200">
+                <a:solidFill>
+                  <a:schemeClr val="tx1"/>
+                </a:solidFill>
+                <a:latin typeface="+mn-lt"/>
+                <a:ea typeface="+mn-ea"/>
+                <a:cs typeface="+mn-cs"/>
+              </a:defRPr>
+            </a:lvl3pPr>
+            <a:lvl4pPr marL="538163" indent="-177800" algn="l" rtl="0" eaLnBrk="0" fontAlgn="base" hangingPunct="0">
+              <a:lnSpc>
+                <a:spcPct val="125000"/>
+              </a:lnSpc>
+              <a:spcBef>
+                <a:spcPct val="0"/>
+              </a:spcBef>
+              <a:spcAft>
+                <a:spcPct val="0"/>
+              </a:spcAft>
+              <a:buFont typeface="Symbol" pitchFamily="18" charset="2"/>
+              <a:buChar char="-"/>
+              <a:defRPr sz="1400" kern="1200">
+                <a:solidFill>
+                  <a:schemeClr val="tx1"/>
+                </a:solidFill>
+                <a:latin typeface="+mn-lt"/>
+                <a:ea typeface="+mn-ea"/>
+                <a:cs typeface="+mn-cs"/>
+              </a:defRPr>
+            </a:lvl4pPr>
+            <a:lvl5pPr marL="714375" indent="-176213" algn="l" rtl="0" eaLnBrk="0" fontAlgn="base" hangingPunct="0">
+              <a:lnSpc>
+                <a:spcPct val="125000"/>
+              </a:lnSpc>
+              <a:spcBef>
+                <a:spcPct val="0"/>
+              </a:spcBef>
+              <a:spcAft>
+                <a:spcPct val="0"/>
+              </a:spcAft>
+              <a:buFont typeface="Symbol" pitchFamily="18" charset="2"/>
+              <a:buChar char="-"/>
+              <a:defRPr sz="1400" kern="1200">
+                <a:solidFill>
+                  <a:schemeClr val="tx1"/>
+                </a:solidFill>
+                <a:latin typeface="+mn-lt"/>
+                <a:ea typeface="+mn-ea"/>
+                <a:cs typeface="+mn-cs"/>
+              </a:defRPr>
+            </a:lvl5pPr>
+            <a:lvl6pPr marL="2514600" indent="-228600" algn="l" defTabSz="914400" rtl="0" eaLnBrk="1" latinLnBrk="0" hangingPunct="1">
+              <a:spcBef>
+                <a:spcPct val="20000"/>
+              </a:spcBef>
+              <a:buFont typeface="Arial" pitchFamily="34" charset="0"/>
+              <a:buChar char="•"/>
+              <a:defRPr sz="2000" kern="1200">
+                <a:solidFill>
+                  <a:schemeClr val="tx1"/>
+                </a:solidFill>
+                <a:latin typeface="+mn-lt"/>
+                <a:ea typeface="+mn-ea"/>
+                <a:cs typeface="+mn-cs"/>
+              </a:defRPr>
+            </a:lvl6pPr>
+            <a:lvl7pPr marL="2971800" indent="-228600" algn="l" defTabSz="914400" rtl="0" eaLnBrk="1" latinLnBrk="0" hangingPunct="1">
+              <a:spcBef>
+                <a:spcPct val="20000"/>
+              </a:spcBef>
+              <a:buFont typeface="Arial" pitchFamily="34" charset="0"/>
+              <a:buChar char="•"/>
+              <a:defRPr sz="2000" kern="1200">
+                <a:solidFill>
+                  <a:schemeClr val="tx1"/>
+                </a:solidFill>
+                <a:latin typeface="+mn-lt"/>
+                <a:ea typeface="+mn-ea"/>
+                <a:cs typeface="+mn-cs"/>
+              </a:defRPr>
+            </a:lvl7pPr>
+            <a:lvl8pPr marL="3429000" indent="-228600" algn="l" defTabSz="914400" rtl="0" eaLnBrk="1" latinLnBrk="0" hangingPunct="1">
+              <a:spcBef>
+                <a:spcPct val="20000"/>
+              </a:spcBef>
+              <a:buFont typeface="Arial" pitchFamily="34" charset="0"/>
+              <a:buChar char="•"/>
+              <a:defRPr sz="2000" kern="1200">
+                <a:solidFill>
+                  <a:schemeClr val="tx1"/>
+                </a:solidFill>
+                <a:latin typeface="+mn-lt"/>
+                <a:ea typeface="+mn-ea"/>
+                <a:cs typeface="+mn-cs"/>
+              </a:defRPr>
+            </a:lvl8pPr>
+            <a:lvl9pPr marL="3886200" indent="-228600" algn="l" defTabSz="914400" rtl="0" eaLnBrk="1" latinLnBrk="0" hangingPunct="1">
+              <a:spcBef>
+                <a:spcPct val="20000"/>
+              </a:spcBef>
+              <a:buFont typeface="Arial" pitchFamily="34" charset="0"/>
+              <a:buChar char="•"/>
+              <a:defRPr sz="2000" kern="1200">
+                <a:solidFill>
+                  <a:schemeClr val="tx1"/>
+                </a:solidFill>
+                <a:latin typeface="+mn-lt"/>
+                <a:ea typeface="+mn-ea"/>
+                <a:cs typeface="+mn-cs"/>
+              </a:defRPr>
+            </a:lvl9pPr>
+          </a:lstStyle>
+          <a:p>
+            <a:r>
+              <a:rPr lang="de-DE" dirty="0"/>
+              <a:t>Lösung:</a:t>
+            </a:r>
+          </a:p>
+        </p:txBody>
+      </p:sp>
+      <p:pic>
+        <p:nvPicPr>
+          <p:cNvPr id="16" name="Grafik 15">
+            <a:extLst>
+              <a:ext uri="{FF2B5EF4-FFF2-40B4-BE49-F238E27FC236}">
+                <a16:creationId xmlns:a16="http://schemas.microsoft.com/office/drawing/2014/main" id="{8ECFE15F-FD51-44E3-8E80-AAB4C9EB21BD}"/>
+              </a:ext>
+            </a:extLst>
+          </p:cNvPr>
+          <p:cNvPicPr>
+            <a:picLocks noChangeAspect="1"/>
+          </p:cNvPicPr>
+          <p:nvPr/>
+        </p:nvPicPr>
+        <p:blipFill>
+          <a:blip r:embed="rId4"/>
+          <a:stretch>
+            <a:fillRect/>
+          </a:stretch>
+        </p:blipFill>
+        <p:spPr>
+          <a:xfrm>
+            <a:off x="5391152" y="3604938"/>
+            <a:ext cx="1242586" cy="710049"/>
+          </a:xfrm>
+          <a:prstGeom prst="rect">
+            <a:avLst/>
+          </a:prstGeom>
+        </p:spPr>
+      </p:pic>
+      <p:pic>
+        <p:nvPicPr>
+          <p:cNvPr id="18" name="Grafik 17">
+            <a:extLst>
+              <a:ext uri="{FF2B5EF4-FFF2-40B4-BE49-F238E27FC236}">
+                <a16:creationId xmlns:a16="http://schemas.microsoft.com/office/drawing/2014/main" id="{CA8A5BCC-C3F6-4952-B4B2-0C66DD598A8E}"/>
+              </a:ext>
+            </a:extLst>
+          </p:cNvPr>
+          <p:cNvPicPr>
+            <a:picLocks noChangeAspect="1"/>
+          </p:cNvPicPr>
+          <p:nvPr/>
+        </p:nvPicPr>
+        <p:blipFill>
+          <a:blip r:embed="rId5"/>
+          <a:stretch>
+            <a:fillRect/>
+          </a:stretch>
+        </p:blipFill>
+        <p:spPr>
+          <a:xfrm>
+            <a:off x="5391152" y="2052330"/>
+            <a:ext cx="837998" cy="650551"/>
+          </a:xfrm>
+          <a:prstGeom prst="rect">
+            <a:avLst/>
+          </a:prstGeom>
+        </p:spPr>
+      </p:pic>
+    </p:spTree>
+    <p:extLst>
+      <p:ext uri="{BB962C8B-B14F-4D97-AF65-F5344CB8AC3E}">
+        <p14:creationId xmlns:p14="http://schemas.microsoft.com/office/powerpoint/2010/main" val="401321795"/>
       </p:ext>
     </p:extLst>
   </p:cSld>

</xml_diff>